<commit_message>
Adding sub repo for tf classification
</commit_message>
<xml_diff>
--- a/PPT1_Proposal.pptx
+++ b/PPT1_Proposal.pptx
@@ -9,22 +9,23 @@
     <p:sldId id="257" r:id="rId3"/>
     <p:sldId id="258" r:id="rId4"/>
     <p:sldId id="262" r:id="rId5"/>
-    <p:sldId id="259" r:id="rId6"/>
-    <p:sldId id="260" r:id="rId7"/>
-    <p:sldId id="263" r:id="rId8"/>
-    <p:sldId id="264" r:id="rId9"/>
-    <p:sldId id="265" r:id="rId10"/>
-    <p:sldId id="266" r:id="rId11"/>
+    <p:sldId id="260" r:id="rId6"/>
+    <p:sldId id="263" r:id="rId7"/>
+    <p:sldId id="264" r:id="rId8"/>
+    <p:sldId id="265" r:id="rId9"/>
+    <p:sldId id="266" r:id="rId10"/>
+    <p:sldId id="268" r:id="rId11"/>
     <p:sldId id="267" r:id="rId12"/>
-    <p:sldId id="268" r:id="rId13"/>
-    <p:sldId id="269" r:id="rId14"/>
-    <p:sldId id="270" r:id="rId15"/>
-    <p:sldId id="271" r:id="rId16"/>
-    <p:sldId id="275" r:id="rId17"/>
-    <p:sldId id="273" r:id="rId18"/>
-    <p:sldId id="274" r:id="rId19"/>
-    <p:sldId id="276" r:id="rId20"/>
-    <p:sldId id="272" r:id="rId21"/>
+    <p:sldId id="269" r:id="rId13"/>
+    <p:sldId id="270" r:id="rId14"/>
+    <p:sldId id="271" r:id="rId15"/>
+    <p:sldId id="275" r:id="rId16"/>
+    <p:sldId id="276" r:id="rId17"/>
+    <p:sldId id="277" r:id="rId18"/>
+    <p:sldId id="278" r:id="rId19"/>
+    <p:sldId id="279" r:id="rId20"/>
+    <p:sldId id="280" r:id="rId21"/>
+    <p:sldId id="272" r:id="rId22"/>
   </p:sldIdLst>
   <p:sldSz cx="12192000" cy="6858000"/>
   <p:notesSz cx="6858000" cy="9144000"/>
@@ -280,7 +281,7 @@
           <a:p>
             <a:fld id="{B9942E28-5A02-442F-B8AF-69E3D245F1EE}" type="datetimeFigureOut">
               <a:rPr lang="en-IN" smtClean="0"/>
-              <a:t>22-01-2020</a:t>
+              <a:t>23-01-2020</a:t>
             </a:fld>
             <a:endParaRPr lang="en-IN"/>
           </a:p>
@@ -480,7 +481,7 @@
           <a:p>
             <a:fld id="{B9942E28-5A02-442F-B8AF-69E3D245F1EE}" type="datetimeFigureOut">
               <a:rPr lang="en-IN" smtClean="0"/>
-              <a:t>22-01-2020</a:t>
+              <a:t>23-01-2020</a:t>
             </a:fld>
             <a:endParaRPr lang="en-IN"/>
           </a:p>
@@ -690,7 +691,7 @@
           <a:p>
             <a:fld id="{B9942E28-5A02-442F-B8AF-69E3D245F1EE}" type="datetimeFigureOut">
               <a:rPr lang="en-IN" smtClean="0"/>
-              <a:t>22-01-2020</a:t>
+              <a:t>23-01-2020</a:t>
             </a:fld>
             <a:endParaRPr lang="en-IN"/>
           </a:p>
@@ -890,7 +891,7 @@
           <a:p>
             <a:fld id="{B9942E28-5A02-442F-B8AF-69E3D245F1EE}" type="datetimeFigureOut">
               <a:rPr lang="en-IN" smtClean="0"/>
-              <a:t>22-01-2020</a:t>
+              <a:t>23-01-2020</a:t>
             </a:fld>
             <a:endParaRPr lang="en-IN"/>
           </a:p>
@@ -1166,7 +1167,7 @@
           <a:p>
             <a:fld id="{B9942E28-5A02-442F-B8AF-69E3D245F1EE}" type="datetimeFigureOut">
               <a:rPr lang="en-IN" smtClean="0"/>
-              <a:t>22-01-2020</a:t>
+              <a:t>23-01-2020</a:t>
             </a:fld>
             <a:endParaRPr lang="en-IN"/>
           </a:p>
@@ -1434,7 +1435,7 @@
           <a:p>
             <a:fld id="{B9942E28-5A02-442F-B8AF-69E3D245F1EE}" type="datetimeFigureOut">
               <a:rPr lang="en-IN" smtClean="0"/>
-              <a:t>22-01-2020</a:t>
+              <a:t>23-01-2020</a:t>
             </a:fld>
             <a:endParaRPr lang="en-IN"/>
           </a:p>
@@ -1849,7 +1850,7 @@
           <a:p>
             <a:fld id="{B9942E28-5A02-442F-B8AF-69E3D245F1EE}" type="datetimeFigureOut">
               <a:rPr lang="en-IN" smtClean="0"/>
-              <a:t>22-01-2020</a:t>
+              <a:t>23-01-2020</a:t>
             </a:fld>
             <a:endParaRPr lang="en-IN"/>
           </a:p>
@@ -1991,7 +1992,7 @@
           <a:p>
             <a:fld id="{B9942E28-5A02-442F-B8AF-69E3D245F1EE}" type="datetimeFigureOut">
               <a:rPr lang="en-IN" smtClean="0"/>
-              <a:t>22-01-2020</a:t>
+              <a:t>23-01-2020</a:t>
             </a:fld>
             <a:endParaRPr lang="en-IN"/>
           </a:p>
@@ -2104,7 +2105,7 @@
           <a:p>
             <a:fld id="{B9942E28-5A02-442F-B8AF-69E3D245F1EE}" type="datetimeFigureOut">
               <a:rPr lang="en-IN" smtClean="0"/>
-              <a:t>22-01-2020</a:t>
+              <a:t>23-01-2020</a:t>
             </a:fld>
             <a:endParaRPr lang="en-IN"/>
           </a:p>
@@ -2417,7 +2418,7 @@
           <a:p>
             <a:fld id="{B9942E28-5A02-442F-B8AF-69E3D245F1EE}" type="datetimeFigureOut">
               <a:rPr lang="en-IN" smtClean="0"/>
-              <a:t>22-01-2020</a:t>
+              <a:t>23-01-2020</a:t>
             </a:fld>
             <a:endParaRPr lang="en-IN"/>
           </a:p>
@@ -2706,7 +2707,7 @@
           <a:p>
             <a:fld id="{B9942E28-5A02-442F-B8AF-69E3D245F1EE}" type="datetimeFigureOut">
               <a:rPr lang="en-IN" smtClean="0"/>
-              <a:t>22-01-2020</a:t>
+              <a:t>23-01-2020</a:t>
             </a:fld>
             <a:endParaRPr lang="en-IN"/>
           </a:p>
@@ -2949,7 +2950,7 @@
           <a:p>
             <a:fld id="{B9942E28-5A02-442F-B8AF-69E3D245F1EE}" type="datetimeFigureOut">
               <a:rPr lang="en-IN" smtClean="0"/>
-              <a:t>22-01-2020</a:t>
+              <a:t>23-01-2020</a:t>
             </a:fld>
             <a:endParaRPr lang="en-IN"/>
           </a:p>
@@ -3352,6 +3353,14 @@
 <file path=ppt/slides/slide1.xml><?xml version="1.0" encoding="utf-8"?>
 <p:sld xmlns:a="http://schemas.openxmlformats.org/drawingml/2006/main" xmlns:r="http://schemas.openxmlformats.org/officeDocument/2006/relationships" xmlns:p="http://schemas.openxmlformats.org/presentationml/2006/main">
   <p:cSld>
+    <p:bg>
+      <p:bgPr>
+        <a:solidFill>
+          <a:schemeClr val="bg1"/>
+        </a:solidFill>
+        <a:effectLst/>
+      </p:bgPr>
+    </p:bg>
     <p:spTree>
       <p:nvGrpSpPr>
         <p:cNvPr id="1" name=""/>
@@ -3366,6 +3375,95 @@
           <a:chExt cx="0" cy="0"/>
         </a:xfrm>
       </p:grpSpPr>
+      <p:sp useBgFill="1">
+        <p:nvSpPr>
+          <p:cNvPr id="8" name="Rectangle 7">
+            <a:extLst>
+              <a:ext uri="{FF2B5EF4-FFF2-40B4-BE49-F238E27FC236}">
+                <a16:creationId xmlns:a16="http://schemas.microsoft.com/office/drawing/2014/main" id="{559AE206-7EBA-4D33-8BC9-9D8158553F0E}"/>
+              </a:ext>
+              <a:ext uri="{C183D7F6-B498-43B3-948B-1728B52AA6E4}">
+                <adec:decorative xmlns:adec="http://schemas.microsoft.com/office/drawing/2017/decorative" val="1"/>
+              </a:ext>
+            </a:extLst>
+          </p:cNvPr>
+          <p:cNvSpPr>
+            <a:spLocks noGrp="1" noRot="1" noChangeAspect="1" noMove="1" noResize="1" noEditPoints="1" noAdjustHandles="1" noChangeArrowheads="1" noChangeShapeType="1" noTextEdit="1"/>
+          </p:cNvSpPr>
+          <p:nvPr>
+            <p:extLst>
+              <p:ext uri="{386F3935-93C4-4BCD-93E2-E3B085C9AB24}">
+                <p16:designElem xmlns:p16="http://schemas.microsoft.com/office/powerpoint/2015/main" val="1"/>
+              </p:ext>
+            </p:extLst>
+          </p:nvPr>
+        </p:nvSpPr>
+        <p:spPr>
+          <a:xfrm>
+            <a:off x="0" y="0"/>
+            <a:ext cx="12192000" cy="6858000"/>
+          </a:xfrm>
+          <a:prstGeom prst="rect">
+            <a:avLst/>
+          </a:prstGeom>
+          <a:ln>
+            <a:noFill/>
+          </a:ln>
+        </p:spPr>
+        <p:style>
+          <a:lnRef idx="2">
+            <a:schemeClr val="accent1">
+              <a:shade val="50000"/>
+            </a:schemeClr>
+          </a:lnRef>
+          <a:fillRef idx="1">
+            <a:schemeClr val="accent1"/>
+          </a:fillRef>
+          <a:effectRef idx="0">
+            <a:schemeClr val="accent1"/>
+          </a:effectRef>
+          <a:fontRef idx="minor">
+            <a:schemeClr val="lt1"/>
+          </a:fontRef>
+        </p:style>
+        <p:txBody>
+          <a:bodyPr rtlCol="0" anchor="ctr"/>
+          <a:lstStyle/>
+          <a:p>
+            <a:pPr marL="0" marR="0" lvl="0" indent="0" algn="ctr" defTabSz="914400" rtl="0" eaLnBrk="1" fontAlgn="auto" latinLnBrk="0" hangingPunct="1">
+              <a:lnSpc>
+                <a:spcPct val="100000"/>
+              </a:lnSpc>
+              <a:spcBef>
+                <a:spcPts val="0"/>
+              </a:spcBef>
+              <a:spcAft>
+                <a:spcPts val="0"/>
+              </a:spcAft>
+              <a:buClrTx/>
+              <a:buSzTx/>
+              <a:buFontTx/>
+              <a:buNone/>
+              <a:tabLst/>
+              <a:defRPr/>
+            </a:pPr>
+            <a:endParaRPr kumimoji="0" lang="en-US" sz="1800" b="0" i="0" u="none" strike="noStrike" kern="1200" cap="none" spc="0" normalizeH="0" baseline="0" noProof="0">
+              <a:ln>
+                <a:noFill/>
+              </a:ln>
+              <a:solidFill>
+                <a:prstClr val="white"/>
+              </a:solidFill>
+              <a:effectLst/>
+              <a:uLnTx/>
+              <a:uFillTx/>
+              <a:latin typeface="Calibri" panose="020F0502020204030204"/>
+              <a:ea typeface="+mn-ea"/>
+              <a:cs typeface="+mn-cs"/>
+            </a:endParaRPr>
+          </a:p>
+        </p:txBody>
+      </p:sp>
       <p:sp>
         <p:nvSpPr>
           <p:cNvPr id="2" name="Title 1">
@@ -3382,15 +3480,24 @@
             <p:ph type="ctrTitle"/>
           </p:nvPr>
         </p:nvSpPr>
-        <p:spPr/>
-        <p:txBody>
-          <a:bodyPr/>
-          <a:lstStyle/>
-          <a:p>
+        <p:spPr>
+          <a:xfrm>
+            <a:off x="838199" y="4525347"/>
+            <a:ext cx="6801321" cy="1737360"/>
+          </a:xfrm>
+        </p:spPr>
+        <p:txBody>
+          <a:bodyPr anchor="ctr">
+            <a:normAutofit/>
+          </a:bodyPr>
+          <a:lstStyle/>
+          <a:p>
+            <a:pPr algn="r"/>
             <a:r>
               <a:rPr lang="en-IN" dirty="0"/>
               <a:t>Proposed Research Themes</a:t>
             </a:r>
+            <a:endParaRPr lang="en-IN"/>
           </a:p>
         </p:txBody>
       </p:sp>
@@ -3410,24 +3517,518 @@
             <p:ph type="subTitle" idx="1"/>
           </p:nvPr>
         </p:nvSpPr>
-        <p:spPr/>
-        <p:txBody>
-          <a:bodyPr/>
-          <a:lstStyle/>
-          <a:p>
+        <p:spPr>
+          <a:xfrm>
+            <a:off x="7961258" y="4525347"/>
+            <a:ext cx="3258675" cy="1737360"/>
+          </a:xfrm>
+        </p:spPr>
+        <p:txBody>
+          <a:bodyPr anchor="ctr">
+            <a:normAutofit/>
+          </a:bodyPr>
+          <a:lstStyle/>
+          <a:p>
+            <a:pPr algn="l"/>
             <a:r>
               <a:rPr lang="en-IN" dirty="0"/>
               <a:t>Kaushik Balasundar</a:t>
             </a:r>
-          </a:p>
-          <a:p>
+            <a:endParaRPr lang="en-IN"/>
+          </a:p>
+          <a:p>
+            <a:pPr algn="l"/>
             <a:r>
               <a:rPr lang="en-IN" dirty="0"/>
               <a:t>RIL, CPDM</a:t>
             </a:r>
-          </a:p>
-        </p:txBody>
-      </p:sp>
+            <a:endParaRPr lang="en-IN"/>
+          </a:p>
+        </p:txBody>
+      </p:sp>
+      <p:sp>
+        <p:nvSpPr>
+          <p:cNvPr id="10" name="Oval 9">
+            <a:extLst>
+              <a:ext uri="{FF2B5EF4-FFF2-40B4-BE49-F238E27FC236}">
+                <a16:creationId xmlns:a16="http://schemas.microsoft.com/office/drawing/2014/main" id="{6437D937-A7F1-4011-92B4-328E5BE1B166}"/>
+              </a:ext>
+              <a:ext uri="{C183D7F6-B498-43B3-948B-1728B52AA6E4}">
+                <adec:decorative xmlns:adec="http://schemas.microsoft.com/office/drawing/2017/decorative" val="1"/>
+              </a:ext>
+            </a:extLst>
+          </p:cNvPr>
+          <p:cNvSpPr>
+            <a:spLocks noGrp="1" noRot="1" noChangeAspect="1" noMove="1" noResize="1" noEditPoints="1" noAdjustHandles="1" noChangeArrowheads="1" noChangeShapeType="1" noTextEdit="1"/>
+          </p:cNvSpPr>
+          <p:nvPr>
+            <p:extLst>
+              <p:ext uri="{386F3935-93C4-4BCD-93E2-E3B085C9AB24}">
+                <p16:designElem xmlns:p16="http://schemas.microsoft.com/office/powerpoint/2015/main" val="1"/>
+              </p:ext>
+            </p:extLst>
+          </p:nvPr>
+        </p:nvSpPr>
+        <p:spPr>
+          <a:xfrm>
+            <a:off x="588567" y="620480"/>
+            <a:ext cx="2243800" cy="2243796"/>
+          </a:xfrm>
+          <a:prstGeom prst="ellipse">
+            <a:avLst/>
+          </a:prstGeom>
+          <a:solidFill>
+            <a:schemeClr val="accent5"/>
+          </a:solidFill>
+          <a:ln>
+            <a:noFill/>
+          </a:ln>
+        </p:spPr>
+        <p:style>
+          <a:lnRef idx="2">
+            <a:schemeClr val="accent1">
+              <a:shade val="50000"/>
+            </a:schemeClr>
+          </a:lnRef>
+          <a:fillRef idx="1">
+            <a:schemeClr val="accent1"/>
+          </a:fillRef>
+          <a:effectRef idx="0">
+            <a:schemeClr val="accent1"/>
+          </a:effectRef>
+          <a:fontRef idx="minor">
+            <a:schemeClr val="lt1"/>
+          </a:fontRef>
+        </p:style>
+        <p:txBody>
+          <a:bodyPr rtlCol="0" anchor="ctr"/>
+          <a:lstStyle/>
+          <a:p>
+            <a:pPr marL="0" marR="0" lvl="0" indent="0" algn="ctr" defTabSz="914400" rtl="0" eaLnBrk="1" fontAlgn="auto" latinLnBrk="0" hangingPunct="1">
+              <a:lnSpc>
+                <a:spcPct val="100000"/>
+              </a:lnSpc>
+              <a:spcBef>
+                <a:spcPts val="0"/>
+              </a:spcBef>
+              <a:spcAft>
+                <a:spcPts val="0"/>
+              </a:spcAft>
+              <a:buClrTx/>
+              <a:buSzTx/>
+              <a:buFontTx/>
+              <a:buNone/>
+              <a:tabLst/>
+              <a:defRPr/>
+            </a:pPr>
+            <a:endParaRPr kumimoji="0" lang="en-US" sz="1800" b="0" i="0" u="none" strike="noStrike" kern="1200" cap="none" spc="0" normalizeH="0" baseline="0" noProof="0">
+              <a:ln>
+                <a:noFill/>
+              </a:ln>
+              <a:solidFill>
+                <a:prstClr val="white"/>
+              </a:solidFill>
+              <a:effectLst/>
+              <a:uLnTx/>
+              <a:uFillTx/>
+              <a:latin typeface="Calibri" panose="020F0502020204030204"/>
+              <a:ea typeface="+mn-ea"/>
+              <a:cs typeface="+mn-cs"/>
+            </a:endParaRPr>
+          </a:p>
+        </p:txBody>
+      </p:sp>
+      <p:sp>
+        <p:nvSpPr>
+          <p:cNvPr id="12" name="Oval 11">
+            <a:extLst>
+              <a:ext uri="{FF2B5EF4-FFF2-40B4-BE49-F238E27FC236}">
+                <a16:creationId xmlns:a16="http://schemas.microsoft.com/office/drawing/2014/main" id="{B672F332-AF08-46C6-94F0-77684310D7B7}"/>
+              </a:ext>
+              <a:ext uri="{C183D7F6-B498-43B3-948B-1728B52AA6E4}">
+                <adec:decorative xmlns:adec="http://schemas.microsoft.com/office/drawing/2017/decorative" val="1"/>
+              </a:ext>
+            </a:extLst>
+          </p:cNvPr>
+          <p:cNvSpPr>
+            <a:spLocks noGrp="1" noRot="1" noChangeAspect="1" noMove="1" noResize="1" noEditPoints="1" noAdjustHandles="1" noChangeArrowheads="1" noChangeShapeType="1" noTextEdit="1"/>
+          </p:cNvSpPr>
+          <p:nvPr>
+            <p:extLst>
+              <p:ext uri="{386F3935-93C4-4BCD-93E2-E3B085C9AB24}">
+                <p16:designElem xmlns:p16="http://schemas.microsoft.com/office/powerpoint/2015/main" val="1"/>
+              </p:ext>
+            </p:extLst>
+          </p:nvPr>
+        </p:nvSpPr>
+        <p:spPr>
+          <a:xfrm>
+            <a:off x="3395001" y="2466604"/>
+            <a:ext cx="962395" cy="962395"/>
+          </a:xfrm>
+          <a:prstGeom prst="ellipse">
+            <a:avLst/>
+          </a:prstGeom>
+          <a:solidFill>
+            <a:schemeClr val="accent4"/>
+          </a:solidFill>
+          <a:ln>
+            <a:noFill/>
+          </a:ln>
+        </p:spPr>
+        <p:style>
+          <a:lnRef idx="2">
+            <a:schemeClr val="accent1">
+              <a:shade val="50000"/>
+            </a:schemeClr>
+          </a:lnRef>
+          <a:fillRef idx="1">
+            <a:schemeClr val="accent1"/>
+          </a:fillRef>
+          <a:effectRef idx="0">
+            <a:schemeClr val="accent1"/>
+          </a:effectRef>
+          <a:fontRef idx="minor">
+            <a:schemeClr val="lt1"/>
+          </a:fontRef>
+        </p:style>
+        <p:txBody>
+          <a:bodyPr rtlCol="0" anchor="ctr"/>
+          <a:lstStyle/>
+          <a:p>
+            <a:pPr marL="0" marR="0" lvl="0" indent="0" algn="ctr" defTabSz="914400" rtl="0" eaLnBrk="1" fontAlgn="auto" latinLnBrk="0" hangingPunct="1">
+              <a:lnSpc>
+                <a:spcPct val="100000"/>
+              </a:lnSpc>
+              <a:spcBef>
+                <a:spcPts val="0"/>
+              </a:spcBef>
+              <a:spcAft>
+                <a:spcPts val="0"/>
+              </a:spcAft>
+              <a:buClrTx/>
+              <a:buSzTx/>
+              <a:buFontTx/>
+              <a:buNone/>
+              <a:tabLst/>
+              <a:defRPr/>
+            </a:pPr>
+            <a:endParaRPr kumimoji="0" lang="en-US" sz="1800" b="0" i="0" u="none" strike="noStrike" kern="1200" cap="none" spc="0" normalizeH="0" baseline="0" noProof="0">
+              <a:ln>
+                <a:noFill/>
+              </a:ln>
+              <a:solidFill>
+                <a:prstClr val="white"/>
+              </a:solidFill>
+              <a:effectLst/>
+              <a:uLnTx/>
+              <a:uFillTx/>
+              <a:latin typeface="Calibri" panose="020F0502020204030204"/>
+              <a:ea typeface="+mn-ea"/>
+              <a:cs typeface="+mn-cs"/>
+            </a:endParaRPr>
+          </a:p>
+        </p:txBody>
+      </p:sp>
+      <p:sp>
+        <p:nvSpPr>
+          <p:cNvPr id="14" name="Oval 13">
+            <a:extLst>
+              <a:ext uri="{FF2B5EF4-FFF2-40B4-BE49-F238E27FC236}">
+                <a16:creationId xmlns:a16="http://schemas.microsoft.com/office/drawing/2014/main" id="{34244EF8-D73A-40E1-BE73-D46E6B4B04ED}"/>
+              </a:ext>
+              <a:ext uri="{C183D7F6-B498-43B3-948B-1728B52AA6E4}">
+                <adec:decorative xmlns:adec="http://schemas.microsoft.com/office/drawing/2017/decorative" val="1"/>
+              </a:ext>
+            </a:extLst>
+          </p:cNvPr>
+          <p:cNvSpPr>
+            <a:spLocks noGrp="1" noRot="1" noChangeAspect="1" noMove="1" noResize="1" noEditPoints="1" noAdjustHandles="1" noChangeArrowheads="1" noChangeShapeType="1" noTextEdit="1"/>
+          </p:cNvSpPr>
+          <p:nvPr>
+            <p:extLst>
+              <p:ext uri="{386F3935-93C4-4BCD-93E2-E3B085C9AB24}">
+                <p16:designElem xmlns:p16="http://schemas.microsoft.com/office/powerpoint/2015/main" val="1"/>
+              </p:ext>
+            </p:extLst>
+          </p:nvPr>
+        </p:nvSpPr>
+        <p:spPr>
+          <a:xfrm>
+            <a:off x="5125829" y="2327988"/>
+            <a:ext cx="293695" cy="293695"/>
+          </a:xfrm>
+          <a:prstGeom prst="ellipse">
+            <a:avLst/>
+          </a:prstGeom>
+          <a:solidFill>
+            <a:schemeClr val="accent3"/>
+          </a:solidFill>
+          <a:ln>
+            <a:noFill/>
+          </a:ln>
+        </p:spPr>
+        <p:style>
+          <a:lnRef idx="2">
+            <a:schemeClr val="accent1">
+              <a:shade val="50000"/>
+            </a:schemeClr>
+          </a:lnRef>
+          <a:fillRef idx="1">
+            <a:schemeClr val="accent1"/>
+          </a:fillRef>
+          <a:effectRef idx="0">
+            <a:schemeClr val="accent1"/>
+          </a:effectRef>
+          <a:fontRef idx="minor">
+            <a:schemeClr val="lt1"/>
+          </a:fontRef>
+        </p:style>
+        <p:txBody>
+          <a:bodyPr rtlCol="0" anchor="ctr"/>
+          <a:lstStyle/>
+          <a:p>
+            <a:pPr marL="0" marR="0" lvl="0" indent="0" algn="ctr" defTabSz="914400" rtl="0" eaLnBrk="1" fontAlgn="auto" latinLnBrk="0" hangingPunct="1">
+              <a:lnSpc>
+                <a:spcPct val="100000"/>
+              </a:lnSpc>
+              <a:spcBef>
+                <a:spcPts val="0"/>
+              </a:spcBef>
+              <a:spcAft>
+                <a:spcPts val="0"/>
+              </a:spcAft>
+              <a:buClrTx/>
+              <a:buSzTx/>
+              <a:buFontTx/>
+              <a:buNone/>
+              <a:tabLst/>
+              <a:defRPr/>
+            </a:pPr>
+            <a:endParaRPr kumimoji="0" lang="en-US" sz="1800" b="0" i="0" u="none" strike="noStrike" kern="1200" cap="none" spc="0" normalizeH="0" baseline="0" noProof="0">
+              <a:ln>
+                <a:noFill/>
+              </a:ln>
+              <a:solidFill>
+                <a:prstClr val="white"/>
+              </a:solidFill>
+              <a:effectLst/>
+              <a:uLnTx/>
+              <a:uFillTx/>
+              <a:latin typeface="Calibri" panose="020F0502020204030204"/>
+              <a:ea typeface="+mn-ea"/>
+              <a:cs typeface="+mn-cs"/>
+            </a:endParaRPr>
+          </a:p>
+        </p:txBody>
+      </p:sp>
+      <p:sp>
+        <p:nvSpPr>
+          <p:cNvPr id="16" name="Freeform: Shape 15">
+            <a:extLst>
+              <a:ext uri="{FF2B5EF4-FFF2-40B4-BE49-F238E27FC236}">
+                <a16:creationId xmlns:a16="http://schemas.microsoft.com/office/drawing/2014/main" id="{AB84D7E8-4ECB-42D7-ADBF-01689B0F24AE}"/>
+              </a:ext>
+              <a:ext uri="{C183D7F6-B498-43B3-948B-1728B52AA6E4}">
+                <adec:decorative xmlns:adec="http://schemas.microsoft.com/office/drawing/2017/decorative" val="1"/>
+              </a:ext>
+            </a:extLst>
+          </p:cNvPr>
+          <p:cNvSpPr>
+            <a:spLocks noGrp="1" noRot="1" noChangeAspect="1" noMove="1" noResize="1" noEditPoints="1" noAdjustHandles="1" noChangeArrowheads="1" noChangeShapeType="1" noTextEdit="1"/>
+          </p:cNvSpPr>
+          <p:nvPr>
+            <p:extLst>
+              <p:ext uri="{386F3935-93C4-4BCD-93E2-E3B085C9AB24}">
+                <p16:designElem xmlns:p16="http://schemas.microsoft.com/office/powerpoint/2015/main" val="1"/>
+              </p:ext>
+            </p:extLst>
+          </p:nvPr>
+        </p:nvSpPr>
+        <p:spPr>
+          <a:xfrm>
+            <a:off x="6492113" y="0"/>
+            <a:ext cx="5699887" cy="4059244"/>
+          </a:xfrm>
+          <a:custGeom>
+            <a:avLst/>
+            <a:gdLst>
+              <a:gd name="connsiteX0" fmla="*/ 0 w 5699887"/>
+              <a:gd name="connsiteY0" fmla="*/ 0 h 4059244"/>
+              <a:gd name="connsiteX1" fmla="*/ 5699887 w 5699887"/>
+              <a:gd name="connsiteY1" fmla="*/ 0 h 4059244"/>
+              <a:gd name="connsiteX2" fmla="*/ 5699887 w 5699887"/>
+              <a:gd name="connsiteY2" fmla="*/ 3944096 h 4059244"/>
+              <a:gd name="connsiteX3" fmla="*/ 5525775 w 5699887"/>
+              <a:gd name="connsiteY3" fmla="*/ 3980429 h 4059244"/>
+              <a:gd name="connsiteX4" fmla="*/ 4663256 w 5699887"/>
+              <a:gd name="connsiteY4" fmla="*/ 4059244 h 4059244"/>
+              <a:gd name="connsiteX5" fmla="*/ 8566 w 5699887"/>
+              <a:gd name="connsiteY5" fmla="*/ 67422 h 4059244"/>
+            </a:gdLst>
+            <a:ahLst/>
+            <a:cxnLst>
+              <a:cxn ang="0">
+                <a:pos x="connsiteX0" y="connsiteY0"/>
+              </a:cxn>
+              <a:cxn ang="0">
+                <a:pos x="connsiteX1" y="connsiteY1"/>
+              </a:cxn>
+              <a:cxn ang="0">
+                <a:pos x="connsiteX2" y="connsiteY2"/>
+              </a:cxn>
+              <a:cxn ang="0">
+                <a:pos x="connsiteX3" y="connsiteY3"/>
+              </a:cxn>
+              <a:cxn ang="0">
+                <a:pos x="connsiteX4" y="connsiteY4"/>
+              </a:cxn>
+              <a:cxn ang="0">
+                <a:pos x="connsiteX5" y="connsiteY5"/>
+              </a:cxn>
+            </a:cxnLst>
+            <a:rect l="l" t="t" r="r" b="b"/>
+            <a:pathLst>
+              <a:path w="5699887" h="4059244">
+                <a:moveTo>
+                  <a:pt x="0" y="0"/>
+                </a:moveTo>
+                <a:lnTo>
+                  <a:pt x="5699887" y="0"/>
+                </a:lnTo>
+                <a:lnTo>
+                  <a:pt x="5699887" y="3944096"/>
+                </a:lnTo>
+                <a:lnTo>
+                  <a:pt x="5525775" y="3980429"/>
+                </a:lnTo>
+                <a:cubicBezTo>
+                  <a:pt x="5246154" y="4032190"/>
+                  <a:pt x="4957865" y="4059244"/>
+                  <a:pt x="4663256" y="4059244"/>
+                </a:cubicBezTo>
+                <a:cubicBezTo>
+                  <a:pt x="2306390" y="4059244"/>
+                  <a:pt x="353936" y="2327747"/>
+                  <a:pt x="8566" y="67422"/>
+                </a:cubicBezTo>
+                <a:close/>
+              </a:path>
+            </a:pathLst>
+          </a:custGeom>
+          <a:solidFill>
+            <a:srgbClr val="595959"/>
+          </a:solidFill>
+          <a:ln>
+            <a:noFill/>
+          </a:ln>
+        </p:spPr>
+        <p:style>
+          <a:lnRef idx="2">
+            <a:schemeClr val="accent1">
+              <a:shade val="50000"/>
+            </a:schemeClr>
+          </a:lnRef>
+          <a:fillRef idx="1">
+            <a:schemeClr val="accent1"/>
+          </a:fillRef>
+          <a:effectRef idx="0">
+            <a:schemeClr val="accent1"/>
+          </a:effectRef>
+          <a:fontRef idx="minor">
+            <a:schemeClr val="lt1"/>
+          </a:fontRef>
+        </p:style>
+        <p:txBody>
+          <a:bodyPr rtlCol="0" anchor="ctr"/>
+          <a:lstStyle/>
+          <a:p>
+            <a:pPr marL="0" marR="0" lvl="0" indent="0" algn="ctr" defTabSz="914400" rtl="0" eaLnBrk="1" fontAlgn="auto" latinLnBrk="0" hangingPunct="1">
+              <a:lnSpc>
+                <a:spcPct val="100000"/>
+              </a:lnSpc>
+              <a:spcBef>
+                <a:spcPts val="0"/>
+              </a:spcBef>
+              <a:spcAft>
+                <a:spcPts val="0"/>
+              </a:spcAft>
+              <a:buClrTx/>
+              <a:buSzTx/>
+              <a:buFontTx/>
+              <a:buNone/>
+              <a:tabLst/>
+              <a:defRPr/>
+            </a:pPr>
+            <a:endParaRPr kumimoji="0" lang="en-US" sz="1800" b="0" i="0" u="none" strike="noStrike" kern="1200" cap="none" spc="0" normalizeH="0" baseline="0" noProof="0">
+              <a:ln>
+                <a:noFill/>
+              </a:ln>
+              <a:solidFill>
+                <a:prstClr val="white"/>
+              </a:solidFill>
+              <a:effectLst/>
+              <a:uLnTx/>
+              <a:uFillTx/>
+              <a:latin typeface="Calibri" panose="020F0502020204030204"/>
+              <a:ea typeface="+mn-ea"/>
+              <a:cs typeface="+mn-cs"/>
+            </a:endParaRPr>
+          </a:p>
+        </p:txBody>
+      </p:sp>
+      <p:cxnSp>
+        <p:nvCxnSpPr>
+          <p:cNvPr id="18" name="Straight Connector 17">
+            <a:extLst>
+              <a:ext uri="{FF2B5EF4-FFF2-40B4-BE49-F238E27FC236}">
+                <a16:creationId xmlns:a16="http://schemas.microsoft.com/office/drawing/2014/main" id="{9E8E38ED-369A-44C2-B635-0BED0E48A6E8}"/>
+              </a:ext>
+              <a:ext uri="{C183D7F6-B498-43B3-948B-1728B52AA6E4}">
+                <adec:decorative xmlns:adec="http://schemas.microsoft.com/office/drawing/2017/decorative" val="1"/>
+              </a:ext>
+            </a:extLst>
+          </p:cNvPr>
+          <p:cNvCxnSpPr>
+            <a:cxnSpLocks noGrp="1" noRot="1" noChangeAspect="1" noMove="1" noResize="1" noEditPoints="1" noAdjustHandles="1" noChangeArrowheads="1" noChangeShapeType="1"/>
+          </p:cNvCxnSpPr>
+          <p:nvPr>
+            <p:extLst>
+              <p:ext uri="{386F3935-93C4-4BCD-93E2-E3B085C9AB24}">
+                <p16:designElem xmlns:p16="http://schemas.microsoft.com/office/powerpoint/2015/main" val="1"/>
+              </p:ext>
+            </p:extLst>
+          </p:nvPr>
+        </p:nvCxnSpPr>
+        <p:spPr>
+          <a:xfrm>
+            <a:off x="7800392" y="4525347"/>
+            <a:ext cx="0" cy="1737360"/>
+          </a:xfrm>
+          <a:prstGeom prst="line">
+            <a:avLst/>
+          </a:prstGeom>
+          <a:ln w="19050" cap="sq">
+            <a:solidFill>
+              <a:schemeClr val="tx1"/>
+            </a:solidFill>
+          </a:ln>
+        </p:spPr>
+        <p:style>
+          <a:lnRef idx="1">
+            <a:schemeClr val="accent1"/>
+          </a:lnRef>
+          <a:fillRef idx="0">
+            <a:schemeClr val="accent1"/>
+          </a:fillRef>
+          <a:effectRef idx="0">
+            <a:schemeClr val="accent1"/>
+          </a:effectRef>
+          <a:fontRef idx="minor">
+            <a:schemeClr val="tx1"/>
+          </a:fontRef>
+        </p:style>
+      </p:cxnSp>
     </p:spTree>
     <p:extLst>
       <p:ext uri="{BB962C8B-B14F-4D97-AF65-F5344CB8AC3E}">
@@ -3444,6 +4045,14 @@
 <file path=ppt/slides/slide10.xml><?xml version="1.0" encoding="utf-8"?>
 <p:sld xmlns:a="http://schemas.openxmlformats.org/drawingml/2006/main" xmlns:r="http://schemas.openxmlformats.org/officeDocument/2006/relationships" xmlns:p="http://schemas.openxmlformats.org/presentationml/2006/main">
   <p:cSld>
+    <p:bg>
+      <p:bgPr>
+        <a:solidFill>
+          <a:schemeClr val="bg1"/>
+        </a:solidFill>
+        <a:effectLst/>
+      </p:bgPr>
+    </p:bg>
     <p:spTree>
       <p:nvGrpSpPr>
         <p:cNvPr id="1" name=""/>
@@ -3463,7 +4072,7 @@
           <p:cNvPr id="2" name="Title 1">
             <a:extLst>
               <a:ext uri="{FF2B5EF4-FFF2-40B4-BE49-F238E27FC236}">
-                <a16:creationId xmlns:a16="http://schemas.microsoft.com/office/drawing/2014/main" id="{363F1B22-6896-4D76-8B3A-D28EBD65FA2C}"/>
+                <a16:creationId xmlns:a16="http://schemas.microsoft.com/office/drawing/2014/main" id="{E9FA71ED-8992-48C0-BE63-BA016DB61875}"/>
               </a:ext>
             </a:extLst>
           </p:cNvPr>
@@ -3472,163 +4081,105 @@
           </p:cNvSpPr>
           <p:nvPr>
             <p:ph type="title"/>
-          </p:nvPr>
-        </p:nvSpPr>
-        <p:spPr/>
-        <p:txBody>
-          <a:bodyPr/>
-          <a:lstStyle/>
-          <a:p>
-            <a:pPr algn="ctr"/>
-            <a:r>
-              <a:rPr lang="en-IN" dirty="0"/>
-              <a:t>Paper 2: Creativity in Robot Manipulation with DRL</a:t>
-            </a:r>
-          </a:p>
-        </p:txBody>
-      </p:sp>
-      <p:sp>
-        <p:nvSpPr>
-          <p:cNvPr id="3" name="Content Placeholder 2">
-            <a:extLst>
-              <a:ext uri="{FF2B5EF4-FFF2-40B4-BE49-F238E27FC236}">
-                <a16:creationId xmlns:a16="http://schemas.microsoft.com/office/drawing/2014/main" id="{92FE5995-9FD2-4B5F-AB4E-E48EF9E978B6}"/>
-              </a:ext>
-            </a:extLst>
-          </p:cNvPr>
-          <p:cNvSpPr>
-            <a:spLocks noGrp="1"/>
-          </p:cNvSpPr>
-          <p:nvPr>
-            <p:ph idx="1"/>
           </p:nvPr>
         </p:nvSpPr>
         <p:spPr>
           <a:xfrm>
-            <a:off x="838200" y="1313895"/>
-            <a:ext cx="11146654" cy="5974672"/>
+            <a:off x="1181100" y="258762"/>
+            <a:ext cx="10515600" cy="822326"/>
           </a:xfrm>
         </p:spPr>
         <p:txBody>
-          <a:bodyPr>
-            <a:normAutofit fontScale="85000" lnSpcReduction="20000"/>
+          <a:bodyPr vert="horz" lIns="91440" tIns="45720" rIns="91440" bIns="45720" rtlCol="0" anchor="ctr">
+            <a:normAutofit/>
           </a:bodyPr>
           <a:lstStyle/>
           <a:p>
-            <a:endParaRPr lang="en-US" dirty="0"/>
-          </a:p>
-          <a:p>
-            <a:pPr marL="0" indent="0" algn="ctr">
-              <a:buNone/>
-            </a:pPr>
-            <a:r>
-              <a:rPr lang="en-US" b="1" dirty="0"/>
-              <a:t>Experiment</a:t>
-            </a:r>
-          </a:p>
-          <a:p>
-            <a:pPr algn="just"/>
-            <a:r>
-              <a:rPr lang="en-US" dirty="0"/>
-              <a:t>3 types of experiments that require the robot to move a box to the target location within the same table in a simulated environment</a:t>
-            </a:r>
-          </a:p>
-          <a:p>
-            <a:pPr marL="0" indent="0" algn="just">
-              <a:buNone/>
-            </a:pPr>
-            <a:r>
-              <a:rPr lang="en-US" dirty="0"/>
-              <a:t>	1. </a:t>
-            </a:r>
-            <a:r>
-              <a:rPr lang="en-US" b="1" dirty="0"/>
-              <a:t>Ditch</a:t>
-            </a:r>
-            <a:r>
-              <a:rPr lang="en-US" dirty="0"/>
-              <a:t>: The Robot and target are separated by a short ditch 2 cm deep and 2.5 	cm 	wide, located at 26.25 cm from the origin</a:t>
-            </a:r>
-          </a:p>
-          <a:p>
-            <a:pPr marL="0" indent="0" algn="just">
-              <a:buNone/>
-            </a:pPr>
-            <a:endParaRPr lang="en-US" dirty="0"/>
-          </a:p>
-          <a:p>
-            <a:pPr marL="0" indent="0" algn="just">
-              <a:buNone/>
-            </a:pPr>
-            <a:r>
-              <a:rPr lang="en-US" dirty="0"/>
-              <a:t>	2. </a:t>
-            </a:r>
-            <a:r>
-              <a:rPr lang="en-US" b="1" dirty="0"/>
-              <a:t>Wall</a:t>
-            </a:r>
-            <a:r>
-              <a:rPr lang="en-US" dirty="0"/>
-              <a:t>:  The Robot and target are separated by a short wall 3 cm high and 1 cm 	wide, 	located 28 cm from the origin, beyond reach of robot</a:t>
-            </a:r>
-          </a:p>
-          <a:p>
-            <a:pPr marL="0" indent="0" algn="just">
-              <a:buNone/>
-            </a:pPr>
-            <a:endParaRPr lang="en-US" dirty="0"/>
-          </a:p>
-          <a:p>
-            <a:pPr marL="0" indent="0" algn="just">
-              <a:buNone/>
-            </a:pPr>
-            <a:r>
-              <a:rPr lang="en-US" dirty="0"/>
-              <a:t>	3. </a:t>
-            </a:r>
-            <a:r>
-              <a:rPr lang="en-IN" b="1" dirty="0" err="1"/>
-              <a:t>TargetNear</a:t>
-            </a:r>
-            <a:r>
-              <a:rPr lang="en-IN" dirty="0"/>
-              <a:t>: </a:t>
-            </a:r>
-            <a:r>
-              <a:rPr lang="en-US" dirty="0"/>
-              <a:t>The Robot and target are separated by a short wall 3 cm high and 	1 cm wide, located 28 cm from the origin, not beyond reach by robot</a:t>
-            </a:r>
-          </a:p>
-          <a:p>
-            <a:pPr marL="0" indent="0">
-              <a:buNone/>
-            </a:pPr>
-            <a:endParaRPr lang="en-US" dirty="0"/>
-          </a:p>
-          <a:p>
-            <a:pPr algn="just"/>
-            <a:r>
-              <a:rPr lang="en-US" dirty="0"/>
-              <a:t>Used negative sparse rewards as an incentive for quick exploration (Success: Score = 0; Failure: Score = -1)</a:t>
-            </a:r>
-          </a:p>
-          <a:p>
-            <a:pPr algn="just"/>
-            <a:r>
-              <a:rPr lang="en-US" dirty="0"/>
-              <a:t>Yet to be implemented on the real hardware </a:t>
-            </a:r>
-          </a:p>
-          <a:p>
-            <a:endParaRPr lang="en-IN" dirty="0"/>
+            <a:pPr algn="ctr"/>
+            <a:r>
+              <a:rPr lang="en-US" sz="3700" dirty="0"/>
+              <a:t>Paper 2: Creativity in Robot Manipulation with DRL</a:t>
+            </a:r>
+          </a:p>
+        </p:txBody>
+      </p:sp>
+      <p:pic>
+        <p:nvPicPr>
+          <p:cNvPr id="5" name="Content Placeholder 4">
+            <a:extLst>
+              <a:ext uri="{FF2B5EF4-FFF2-40B4-BE49-F238E27FC236}">
+                <a16:creationId xmlns:a16="http://schemas.microsoft.com/office/drawing/2014/main" id="{42F08421-09DD-4A12-8A5B-A3C7C534A23E}"/>
+              </a:ext>
+            </a:extLst>
+          </p:cNvPr>
+          <p:cNvPicPr>
+            <a:picLocks noGrp="1" noChangeAspect="1"/>
+          </p:cNvPicPr>
+          <p:nvPr>
+            <p:ph idx="1"/>
+          </p:nvPr>
+        </p:nvPicPr>
+        <p:blipFill rotWithShape="1">
+          <a:blip r:embed="rId2">
+            <a:extLst>
+              <a:ext uri="{28A0092B-C50C-407E-A947-70E740481C1C}">
+                <a14:useLocalDpi xmlns:a14="http://schemas.microsoft.com/office/drawing/2010/main" val="0"/>
+              </a:ext>
+            </a:extLst>
+          </a:blip>
+          <a:srcRect t="5834"/>
+          <a:stretch/>
+        </p:blipFill>
+        <p:spPr>
+          <a:xfrm>
+            <a:off x="133370" y="1790700"/>
+            <a:ext cx="12191980" cy="5067300"/>
+          </a:xfrm>
+          <a:prstGeom prst="rect">
+            <a:avLst/>
+          </a:prstGeom>
+        </p:spPr>
+      </p:pic>
+      <p:sp>
+        <p:nvSpPr>
+          <p:cNvPr id="6" name="TextBox 5">
+            <a:extLst>
+              <a:ext uri="{FF2B5EF4-FFF2-40B4-BE49-F238E27FC236}">
+                <a16:creationId xmlns:a16="http://schemas.microsoft.com/office/drawing/2014/main" id="{17F564C3-61D7-43F7-9DF0-AFC8BFECCC86}"/>
+              </a:ext>
+            </a:extLst>
+          </p:cNvPr>
+          <p:cNvSpPr txBox="1"/>
+          <p:nvPr/>
+        </p:nvSpPr>
+        <p:spPr>
+          <a:xfrm>
+            <a:off x="3762375" y="1081088"/>
+            <a:ext cx="4819650" cy="369332"/>
+          </a:xfrm>
+          <a:prstGeom prst="rect">
+            <a:avLst/>
+          </a:prstGeom>
+          <a:noFill/>
+        </p:spPr>
+        <p:txBody>
+          <a:bodyPr wrap="square" rtlCol="0">
+            <a:spAutoFit/>
+          </a:bodyPr>
+          <a:lstStyle/>
+          <a:p>
+            <a:pPr algn="ctr"/>
+            <a:r>
+              <a:rPr lang="en-IN" b="1" dirty="0"/>
+              <a:t>Demonstration of Creativity: Punching</a:t>
+            </a:r>
           </a:p>
         </p:txBody>
       </p:sp>
     </p:spTree>
     <p:extLst>
       <p:ext uri="{BB962C8B-B14F-4D97-AF65-F5344CB8AC3E}">
-        <p14:creationId xmlns:p14="http://schemas.microsoft.com/office/powerpoint/2010/main" val="2993472623"/>
+        <p14:creationId xmlns:p14="http://schemas.microsoft.com/office/powerpoint/2010/main" val="2340158581"/>
       </p:ext>
     </p:extLst>
   </p:cSld>
@@ -3797,14 +4348,6 @@
 <file path=ppt/slides/slide12.xml><?xml version="1.0" encoding="utf-8"?>
 <p:sld xmlns:a="http://schemas.openxmlformats.org/drawingml/2006/main" xmlns:r="http://schemas.openxmlformats.org/officeDocument/2006/relationships" xmlns:p="http://schemas.openxmlformats.org/presentationml/2006/main">
   <p:cSld>
-    <p:bg>
-      <p:bgPr>
-        <a:solidFill>
-          <a:schemeClr val="bg1"/>
-        </a:solidFill>
-        <a:effectLst/>
-      </p:bgPr>
-    </p:bg>
     <p:spTree>
       <p:nvGrpSpPr>
         <p:cNvPr id="1" name=""/>
@@ -3824,7 +4367,7 @@
           <p:cNvPr id="2" name="Title 1">
             <a:extLst>
               <a:ext uri="{FF2B5EF4-FFF2-40B4-BE49-F238E27FC236}">
-                <a16:creationId xmlns:a16="http://schemas.microsoft.com/office/drawing/2014/main" id="{E9FA71ED-8992-48C0-BE63-BA016DB61875}"/>
+                <a16:creationId xmlns:a16="http://schemas.microsoft.com/office/drawing/2014/main" id="{D2B75A61-9038-4E87-BEEB-29896AFF3EC5}"/>
               </a:ext>
             </a:extLst>
           </p:cNvPr>
@@ -3833,105 +4376,102 @@
           </p:cNvSpPr>
           <p:nvPr>
             <p:ph type="title"/>
+          </p:nvPr>
+        </p:nvSpPr>
+        <p:spPr/>
+        <p:txBody>
+          <a:bodyPr/>
+          <a:lstStyle/>
+          <a:p>
+            <a:pPr algn="ctr"/>
+            <a:r>
+              <a:rPr lang="en-IN" dirty="0"/>
+              <a:t>Paper 3: Zero Shot Visual Imitation</a:t>
+            </a:r>
+          </a:p>
+        </p:txBody>
+      </p:sp>
+      <p:sp>
+        <p:nvSpPr>
+          <p:cNvPr id="3" name="Content Placeholder 2">
+            <a:extLst>
+              <a:ext uri="{FF2B5EF4-FFF2-40B4-BE49-F238E27FC236}">
+                <a16:creationId xmlns:a16="http://schemas.microsoft.com/office/drawing/2014/main" id="{63E03442-9EB1-4364-B39C-08E3205F786E}"/>
+              </a:ext>
+            </a:extLst>
+          </p:cNvPr>
+          <p:cNvSpPr>
+            <a:spLocks noGrp="1"/>
+          </p:cNvSpPr>
+          <p:nvPr>
+            <p:ph idx="1"/>
           </p:nvPr>
         </p:nvSpPr>
         <p:spPr>
           <a:xfrm>
-            <a:off x="1181100" y="258762"/>
-            <a:ext cx="10515600" cy="822326"/>
+            <a:off x="838200" y="1825624"/>
+            <a:ext cx="11270942" cy="4743851"/>
           </a:xfrm>
         </p:spPr>
         <p:txBody>
-          <a:bodyPr vert="horz" lIns="91440" tIns="45720" rIns="91440" bIns="45720" rtlCol="0" anchor="ctr">
+          <a:bodyPr>
             <a:normAutofit/>
           </a:bodyPr>
           <a:lstStyle/>
           <a:p>
-            <a:pPr algn="ctr"/>
-            <a:r>
-              <a:rPr lang="en-US" sz="3700" dirty="0"/>
-              <a:t>Paper 2: Creativity in Robot Manipulation with DRL</a:t>
-            </a:r>
-          </a:p>
-        </p:txBody>
-      </p:sp>
-      <p:pic>
-        <p:nvPicPr>
-          <p:cNvPr id="5" name="Content Placeholder 4">
-            <a:extLst>
-              <a:ext uri="{FF2B5EF4-FFF2-40B4-BE49-F238E27FC236}">
-                <a16:creationId xmlns:a16="http://schemas.microsoft.com/office/drawing/2014/main" id="{42F08421-09DD-4A12-8A5B-A3C7C534A23E}"/>
-              </a:ext>
-            </a:extLst>
-          </p:cNvPr>
-          <p:cNvPicPr>
-            <a:picLocks noGrp="1" noChangeAspect="1"/>
-          </p:cNvPicPr>
-          <p:nvPr>
-            <p:ph idx="1"/>
-          </p:nvPr>
-        </p:nvPicPr>
-        <p:blipFill rotWithShape="1">
-          <a:blip r:embed="rId2">
-            <a:extLst>
-              <a:ext uri="{28A0092B-C50C-407E-A947-70E740481C1C}">
-                <a14:useLocalDpi xmlns:a14="http://schemas.microsoft.com/office/drawing/2010/main" val="0"/>
-              </a:ext>
-            </a:extLst>
-          </a:blip>
-          <a:srcRect t="5834"/>
-          <a:stretch/>
-        </p:blipFill>
-        <p:spPr>
-          <a:xfrm>
-            <a:off x="133370" y="1790700"/>
-            <a:ext cx="12191980" cy="5067300"/>
-          </a:xfrm>
-          <a:prstGeom prst="rect">
-            <a:avLst/>
-          </a:prstGeom>
-        </p:spPr>
-      </p:pic>
-      <p:sp>
-        <p:nvSpPr>
-          <p:cNvPr id="6" name="TextBox 5">
-            <a:extLst>
-              <a:ext uri="{FF2B5EF4-FFF2-40B4-BE49-F238E27FC236}">
-                <a16:creationId xmlns:a16="http://schemas.microsoft.com/office/drawing/2014/main" id="{17F564C3-61D7-43F7-9DF0-AFC8BFECCC86}"/>
-              </a:ext>
-            </a:extLst>
-          </p:cNvPr>
-          <p:cNvSpPr txBox="1"/>
-          <p:nvPr/>
-        </p:nvSpPr>
-        <p:spPr>
-          <a:xfrm>
-            <a:off x="3762375" y="1081088"/>
-            <a:ext cx="4819650" cy="369332"/>
-          </a:xfrm>
-          <a:prstGeom prst="rect">
-            <a:avLst/>
-          </a:prstGeom>
-          <a:noFill/>
-        </p:spPr>
-        <p:txBody>
-          <a:bodyPr wrap="square" rtlCol="0">
-            <a:spAutoFit/>
-          </a:bodyPr>
-          <a:lstStyle/>
-          <a:p>
-            <a:pPr algn="ctr"/>
+            <a:r>
+              <a:rPr lang="en-IN" dirty="0"/>
+              <a:t>Background of Researchers: MIT, UC Berkeley</a:t>
+            </a:r>
+          </a:p>
+          <a:p>
+            <a:r>
+              <a:rPr lang="en-IN" dirty="0"/>
+              <a:t>Publication: ICLR, 2018 </a:t>
+            </a:r>
+          </a:p>
+          <a:p>
+            <a:endParaRPr lang="en-IN" dirty="0"/>
+          </a:p>
+          <a:p>
+            <a:pPr marL="0" indent="0" algn="ctr">
+              <a:buNone/>
+            </a:pPr>
             <a:r>
               <a:rPr lang="en-IN" b="1" dirty="0"/>
-              <a:t>Demonstration of Creativity: Punching</a:t>
-            </a:r>
+              <a:t>Abstract</a:t>
+            </a:r>
+          </a:p>
+          <a:p>
+            <a:pPr algn="just"/>
+            <a:r>
+              <a:rPr lang="en-US" dirty="0"/>
+              <a:t>Imitation learning relies on strong supervision of expert actions. </a:t>
+            </a:r>
+          </a:p>
+          <a:p>
+            <a:pPr algn="just"/>
+            <a:r>
+              <a:rPr lang="en-US" dirty="0"/>
+              <a:t>Here, the agent first explores the world without any expert supervision and then distills its experience into a goal-conditioned skill policy. The role of the expert is NOT to train, only to communicate the goal. </a:t>
+            </a:r>
+          </a:p>
+          <a:p>
+            <a:pPr algn="just"/>
+            <a:r>
+              <a:rPr lang="en-US" dirty="0"/>
+              <a:t>Agent has no access to expert training data, and thus called ‘Zero-Shot’.</a:t>
+            </a:r>
+          </a:p>
+          <a:p>
+            <a:endParaRPr lang="en-IN" dirty="0"/>
           </a:p>
         </p:txBody>
       </p:sp>
     </p:spTree>
     <p:extLst>
       <p:ext uri="{BB962C8B-B14F-4D97-AF65-F5344CB8AC3E}">
-        <p14:creationId xmlns:p14="http://schemas.microsoft.com/office/powerpoint/2010/main" val="2340158581"/>
+        <p14:creationId xmlns:p14="http://schemas.microsoft.com/office/powerpoint/2010/main" val="2983856135"/>
       </p:ext>
     </p:extLst>
   </p:cSld>
@@ -3963,142 +4503,6 @@
           <p:cNvPr id="2" name="Title 1">
             <a:extLst>
               <a:ext uri="{FF2B5EF4-FFF2-40B4-BE49-F238E27FC236}">
-                <a16:creationId xmlns:a16="http://schemas.microsoft.com/office/drawing/2014/main" id="{D2B75A61-9038-4E87-BEEB-29896AFF3EC5}"/>
-              </a:ext>
-            </a:extLst>
-          </p:cNvPr>
-          <p:cNvSpPr>
-            <a:spLocks noGrp="1"/>
-          </p:cNvSpPr>
-          <p:nvPr>
-            <p:ph type="title"/>
-          </p:nvPr>
-        </p:nvSpPr>
-        <p:spPr/>
-        <p:txBody>
-          <a:bodyPr/>
-          <a:lstStyle/>
-          <a:p>
-            <a:pPr algn="ctr"/>
-            <a:r>
-              <a:rPr lang="en-IN" dirty="0"/>
-              <a:t>Paper 3: Zero Shot Visual Imitation</a:t>
-            </a:r>
-          </a:p>
-        </p:txBody>
-      </p:sp>
-      <p:sp>
-        <p:nvSpPr>
-          <p:cNvPr id="3" name="Content Placeholder 2">
-            <a:extLst>
-              <a:ext uri="{FF2B5EF4-FFF2-40B4-BE49-F238E27FC236}">
-                <a16:creationId xmlns:a16="http://schemas.microsoft.com/office/drawing/2014/main" id="{63E03442-9EB1-4364-B39C-08E3205F786E}"/>
-              </a:ext>
-            </a:extLst>
-          </p:cNvPr>
-          <p:cNvSpPr>
-            <a:spLocks noGrp="1"/>
-          </p:cNvSpPr>
-          <p:nvPr>
-            <p:ph idx="1"/>
-          </p:nvPr>
-        </p:nvSpPr>
-        <p:spPr>
-          <a:xfrm>
-            <a:off x="838200" y="1825624"/>
-            <a:ext cx="11270942" cy="4743851"/>
-          </a:xfrm>
-        </p:spPr>
-        <p:txBody>
-          <a:bodyPr>
-            <a:normAutofit/>
-          </a:bodyPr>
-          <a:lstStyle/>
-          <a:p>
-            <a:r>
-              <a:rPr lang="en-IN" dirty="0"/>
-              <a:t>Background of Researchers: MIT, UC Berkeley</a:t>
-            </a:r>
-          </a:p>
-          <a:p>
-            <a:r>
-              <a:rPr lang="en-IN" dirty="0"/>
-              <a:t>Publication: ICLR, 2018 </a:t>
-            </a:r>
-          </a:p>
-          <a:p>
-            <a:endParaRPr lang="en-IN" dirty="0"/>
-          </a:p>
-          <a:p>
-            <a:pPr marL="0" indent="0" algn="ctr">
-              <a:buNone/>
-            </a:pPr>
-            <a:r>
-              <a:rPr lang="en-IN" b="1" dirty="0"/>
-              <a:t>Abstract</a:t>
-            </a:r>
-          </a:p>
-          <a:p>
-            <a:pPr algn="just"/>
-            <a:r>
-              <a:rPr lang="en-US" dirty="0"/>
-              <a:t>Imitation learning relies on strong supervision of expert actions. </a:t>
-            </a:r>
-          </a:p>
-          <a:p>
-            <a:pPr algn="just"/>
-            <a:r>
-              <a:rPr lang="en-US" dirty="0"/>
-              <a:t>Here, the agent first explores the world without any expert supervision and then distills its experience into a goal-conditioned skill policy. The role of the expert is NOT to train, only to communicate the goal. </a:t>
-            </a:r>
-          </a:p>
-          <a:p>
-            <a:pPr algn="just"/>
-            <a:r>
-              <a:rPr lang="en-US" dirty="0"/>
-              <a:t>Agent has no access to expert training data, and thus called ‘Zero-Shot’.</a:t>
-            </a:r>
-          </a:p>
-          <a:p>
-            <a:endParaRPr lang="en-IN" dirty="0"/>
-          </a:p>
-        </p:txBody>
-      </p:sp>
-    </p:spTree>
-    <p:extLst>
-      <p:ext uri="{BB962C8B-B14F-4D97-AF65-F5344CB8AC3E}">
-        <p14:creationId xmlns:p14="http://schemas.microsoft.com/office/powerpoint/2010/main" val="2983856135"/>
-      </p:ext>
-    </p:extLst>
-  </p:cSld>
-  <p:clrMapOvr>
-    <a:masterClrMapping/>
-  </p:clrMapOvr>
-</p:sld>
-</file>
-
-<file path=ppt/slides/slide14.xml><?xml version="1.0" encoding="utf-8"?>
-<p:sld xmlns:a="http://schemas.openxmlformats.org/drawingml/2006/main" xmlns:r="http://schemas.openxmlformats.org/officeDocument/2006/relationships" xmlns:p="http://schemas.openxmlformats.org/presentationml/2006/main">
-  <p:cSld>
-    <p:spTree>
-      <p:nvGrpSpPr>
-        <p:cNvPr id="1" name=""/>
-        <p:cNvGrpSpPr/>
-        <p:nvPr/>
-      </p:nvGrpSpPr>
-      <p:grpSpPr>
-        <a:xfrm>
-          <a:off x="0" y="0"/>
-          <a:ext cx="0" cy="0"/>
-          <a:chOff x="0" y="0"/>
-          <a:chExt cx="0" cy="0"/>
-        </a:xfrm>
-      </p:grpSpPr>
-      <p:sp>
-        <p:nvSpPr>
-          <p:cNvPr id="2" name="Title 1">
-            <a:extLst>
-              <a:ext uri="{FF2B5EF4-FFF2-40B4-BE49-F238E27FC236}">
                 <a16:creationId xmlns:a16="http://schemas.microsoft.com/office/drawing/2014/main" id="{C16CB8BF-C551-4115-A40C-9772A86DA08C}"/>
               </a:ext>
             </a:extLst>
@@ -4179,7 +4583,7 @@
             <a:pPr algn="just"/>
             <a:r>
               <a:rPr lang="en-US" dirty="0"/>
-              <a:t>In ZSVI, agent explores the environment without any expert supervision or extrinsic rewards and distills this exploration data into goal-directed skills (actions to be taken to move robot from current state to goal) called Goal Conditioned Skill Policy (GSP).</a:t>
+              <a:t>In ZSVI, agent explores the environment without any expert supervision or extrinsic rewards and distills this exploration data into goal-directed skills (actions to be taken to move robot from current state to goal) called Goal Conditioned Skill Policy (GSP)</a:t>
             </a:r>
           </a:p>
           <a:p>
@@ -4215,7 +4619,7 @@
 </p:sld>
 </file>
 
-<file path=ppt/slides/slide15.xml><?xml version="1.0" encoding="utf-8"?>
+<file path=ppt/slides/slide14.xml><?xml version="1.0" encoding="utf-8"?>
 <p:sld xmlns:a="http://schemas.openxmlformats.org/drawingml/2006/main" xmlns:r="http://schemas.openxmlformats.org/officeDocument/2006/relationships" xmlns:p="http://schemas.openxmlformats.org/presentationml/2006/main">
   <p:cSld>
     <p:bg>
@@ -4626,6 +5030,175 @@
 </p:sld>
 </file>
 
+<file path=ppt/slides/slide15.xml><?xml version="1.0" encoding="utf-8"?>
+<p:sld xmlns:a="http://schemas.openxmlformats.org/drawingml/2006/main" xmlns:r="http://schemas.openxmlformats.org/officeDocument/2006/relationships" xmlns:p="http://schemas.openxmlformats.org/presentationml/2006/main">
+  <p:cSld>
+    <p:spTree>
+      <p:nvGrpSpPr>
+        <p:cNvPr id="1" name=""/>
+        <p:cNvGrpSpPr/>
+        <p:nvPr/>
+      </p:nvGrpSpPr>
+      <p:grpSpPr>
+        <a:xfrm>
+          <a:off x="0" y="0"/>
+          <a:ext cx="0" cy="0"/>
+          <a:chOff x="0" y="0"/>
+          <a:chExt cx="0" cy="0"/>
+        </a:xfrm>
+      </p:grpSpPr>
+      <p:sp>
+        <p:nvSpPr>
+          <p:cNvPr id="2" name="Title 1">
+            <a:extLst>
+              <a:ext uri="{FF2B5EF4-FFF2-40B4-BE49-F238E27FC236}">
+                <a16:creationId xmlns:a16="http://schemas.microsoft.com/office/drawing/2014/main" id="{82F24039-4079-4CFD-B829-59D729ED80F5}"/>
+              </a:ext>
+            </a:extLst>
+          </p:cNvPr>
+          <p:cNvSpPr>
+            <a:spLocks noGrp="1"/>
+          </p:cNvSpPr>
+          <p:nvPr>
+            <p:ph type="title"/>
+          </p:nvPr>
+        </p:nvSpPr>
+        <p:spPr/>
+        <p:txBody>
+          <a:bodyPr>
+            <a:normAutofit fontScale="90000"/>
+          </a:bodyPr>
+          <a:lstStyle/>
+          <a:p>
+            <a:pPr algn="ctr"/>
+            <a:r>
+              <a:rPr lang="en-IN" dirty="0"/>
+              <a:t>Paper 4: </a:t>
+            </a:r>
+            <a:r>
+              <a:rPr lang="en-US" dirty="0"/>
+              <a:t>Learning Synergies between Pushing and Grasping with Self-supervised Deep Reinforcement Learning </a:t>
+            </a:r>
+            <a:endParaRPr lang="en-IN" dirty="0"/>
+          </a:p>
+        </p:txBody>
+      </p:sp>
+      <p:sp>
+        <p:nvSpPr>
+          <p:cNvPr id="3" name="Content Placeholder 2">
+            <a:extLst>
+              <a:ext uri="{FF2B5EF4-FFF2-40B4-BE49-F238E27FC236}">
+                <a16:creationId xmlns:a16="http://schemas.microsoft.com/office/drawing/2014/main" id="{57E3D9CF-BB24-4944-8A2B-2C3F4883FAB8}"/>
+              </a:ext>
+            </a:extLst>
+          </p:cNvPr>
+          <p:cNvSpPr>
+            <a:spLocks noGrp="1"/>
+          </p:cNvSpPr>
+          <p:nvPr>
+            <p:ph idx="1"/>
+          </p:nvPr>
+        </p:nvSpPr>
+        <p:spPr>
+          <a:xfrm>
+            <a:off x="97654" y="1825624"/>
+            <a:ext cx="12094346" cy="4965793"/>
+          </a:xfrm>
+        </p:spPr>
+        <p:txBody>
+          <a:bodyPr>
+            <a:normAutofit fontScale="77500" lnSpcReduction="20000"/>
+          </a:bodyPr>
+          <a:lstStyle/>
+          <a:p>
+            <a:r>
+              <a:rPr lang="en-US" dirty="0"/>
+              <a:t>Background of Researchers: Princeton University, Google, MIT</a:t>
+            </a:r>
+          </a:p>
+          <a:p>
+            <a:r>
+              <a:rPr lang="en-US" dirty="0"/>
+              <a:t>Year of Publication: IROS, Sept., 2018 (Best Cognitive Robotics Paper)</a:t>
+            </a:r>
+          </a:p>
+          <a:p>
+            <a:endParaRPr lang="en-US" dirty="0"/>
+          </a:p>
+          <a:p>
+            <a:pPr marL="0" indent="0" algn="ctr">
+              <a:buNone/>
+            </a:pPr>
+            <a:r>
+              <a:rPr lang="en-US" b="1" dirty="0"/>
+              <a:t>SUMMARY:</a:t>
+            </a:r>
+          </a:p>
+          <a:p>
+            <a:pPr algn="just"/>
+            <a:r>
+              <a:rPr lang="en-US" dirty="0"/>
+              <a:t>In this work, they demonstrate that it is possible to discover and learn these synergies from scratch through model-free deep reinforcement learning</a:t>
+            </a:r>
+          </a:p>
+          <a:p>
+            <a:pPr algn="just"/>
+            <a:r>
+              <a:rPr lang="en-US" dirty="0"/>
+              <a:t>Involves training two fully convolutional networks that map from visual observations to actions: one for utility of pushes and another for utility of grasping</a:t>
+            </a:r>
+          </a:p>
+          <a:p>
+            <a:pPr algn="just"/>
+            <a:r>
+              <a:rPr lang="en-US" dirty="0"/>
+              <a:t>Both networks are trained jointly in a Q-learning framework and are entirely self-supervised by trial and error</a:t>
+            </a:r>
+          </a:p>
+          <a:p>
+            <a:pPr algn="just"/>
+            <a:r>
+              <a:rPr lang="en-US" dirty="0"/>
+              <a:t>Rewards are provided from successful grasps</a:t>
+            </a:r>
+          </a:p>
+          <a:p>
+            <a:pPr algn="just"/>
+            <a:r>
+              <a:rPr lang="en-US" dirty="0"/>
+              <a:t>Policy learns pushing motions that enable future grasps due to this reward</a:t>
+            </a:r>
+          </a:p>
+          <a:p>
+            <a:pPr algn="just"/>
+            <a:r>
+              <a:rPr lang="en-US" dirty="0"/>
+              <a:t>Qualitatively tested using  V-Rep simulation and U5</a:t>
+            </a:r>
+          </a:p>
+          <a:p>
+            <a:pPr algn="just"/>
+            <a:r>
+              <a:rPr lang="en-US" dirty="0"/>
+              <a:t>During picking experiments in both simulation and real-world scenarios, their system quickly learns complex behaviors amid challenging cases of clutter</a:t>
+            </a:r>
+            <a:endParaRPr lang="en-IN" dirty="0"/>
+          </a:p>
+        </p:txBody>
+      </p:sp>
+    </p:spTree>
+    <p:extLst>
+      <p:ext uri="{BB962C8B-B14F-4D97-AF65-F5344CB8AC3E}">
+        <p14:creationId xmlns:p14="http://schemas.microsoft.com/office/powerpoint/2010/main" val="3297913472"/>
+      </p:ext>
+    </p:extLst>
+  </p:cSld>
+  <p:clrMapOvr>
+    <a:masterClrMapping/>
+  </p:clrMapOvr>
+</p:sld>
+</file>
+
 <file path=ppt/slides/slide16.xml><?xml version="1.0" encoding="utf-8"?>
 <p:sld xmlns:a="http://schemas.openxmlformats.org/drawingml/2006/main" xmlns:r="http://schemas.openxmlformats.org/officeDocument/2006/relationships" xmlns:p="http://schemas.openxmlformats.org/presentationml/2006/main">
   <p:cSld>
@@ -4648,7 +5221,7 @@
           <p:cNvPr id="2" name="Title 1">
             <a:extLst>
               <a:ext uri="{FF2B5EF4-FFF2-40B4-BE49-F238E27FC236}">
-                <a16:creationId xmlns:a16="http://schemas.microsoft.com/office/drawing/2014/main" id="{82F24039-4079-4CFD-B829-59D729ED80F5}"/>
+                <a16:creationId xmlns:a16="http://schemas.microsoft.com/office/drawing/2014/main" id="{D6B0B6F4-37FE-4938-A13F-F764B82496F2}"/>
               </a:ext>
             </a:extLst>
           </p:cNvPr>
@@ -4659,7 +5232,12 @@
             <p:ph type="title"/>
           </p:nvPr>
         </p:nvSpPr>
-        <p:spPr/>
+        <p:spPr>
+          <a:xfrm>
+            <a:off x="124287" y="681037"/>
+            <a:ext cx="12180163" cy="1009651"/>
+          </a:xfrm>
+        </p:spPr>
         <p:txBody>
           <a:bodyPr>
             <a:normAutofit fontScale="90000"/>
@@ -4669,12 +5247,15 @@
             <a:pPr algn="ctr"/>
             <a:r>
               <a:rPr lang="en-IN" dirty="0"/>
-              <a:t>Paper 4: </a:t>
+              <a:t>Paper 5: </a:t>
             </a:r>
             <a:r>
               <a:rPr lang="en-US" dirty="0"/>
-              <a:t>Learning Synergies between Pushing and Grasping with Self-supervised Deep Reinforcement Learning </a:t>
-            </a:r>
+              <a:t>Deep Reinforcement Learning for Industrial Insertion Tasks with Visual Inputs and Natural Rewards</a:t>
+            </a:r>
+            <a:br>
+              <a:rPr lang="en-US" dirty="0"/>
+            </a:br>
             <a:endParaRPr lang="en-IN" dirty="0"/>
           </a:p>
         </p:txBody>
@@ -4684,7 +5265,7 @@
           <p:cNvPr id="3" name="Content Placeholder 2">
             <a:extLst>
               <a:ext uri="{FF2B5EF4-FFF2-40B4-BE49-F238E27FC236}">
-                <a16:creationId xmlns:a16="http://schemas.microsoft.com/office/drawing/2014/main" id="{57E3D9CF-BB24-4944-8A2B-2C3F4883FAB8}"/>
+                <a16:creationId xmlns:a16="http://schemas.microsoft.com/office/drawing/2014/main" id="{30512920-1F3C-41BA-887F-CA3B94B49FFD}"/>
               </a:ext>
             </a:extLst>
           </p:cNvPr>
@@ -4695,97 +5276,59 @@
             <p:ph idx="1"/>
           </p:nvPr>
         </p:nvSpPr>
-        <p:spPr>
-          <a:xfrm>
-            <a:off x="97654" y="1825624"/>
-            <a:ext cx="12094346" cy="4965793"/>
-          </a:xfrm>
-        </p:spPr>
+        <p:spPr/>
         <p:txBody>
           <a:bodyPr>
-            <a:normAutofit fontScale="77500" lnSpcReduction="20000"/>
+            <a:normAutofit/>
           </a:bodyPr>
           <a:lstStyle/>
           <a:p>
             <a:r>
-              <a:rPr lang="en-US" dirty="0"/>
-              <a:t>Background of Researchers: Princeton University, Google, MIT</a:t>
-            </a:r>
-          </a:p>
-          <a:p>
-            <a:r>
-              <a:rPr lang="en-US" dirty="0"/>
-              <a:t>Year of Publication: IROS, Sept., 2018 (Best Cognitive Robotics Paper)</a:t>
-            </a:r>
-          </a:p>
-          <a:p>
-            <a:endParaRPr lang="en-US" dirty="0"/>
+              <a:rPr lang="en-IN" dirty="0"/>
+              <a:t>Background of Researchers: Siemens, UC Berkeley</a:t>
+            </a:r>
+          </a:p>
+          <a:p>
+            <a:r>
+              <a:rPr lang="en-IN" dirty="0"/>
+              <a:t>Year of Publication: Aug., 2019</a:t>
+            </a:r>
+          </a:p>
+          <a:p>
+            <a:endParaRPr lang="en-IN" b="1" dirty="0"/>
           </a:p>
           <a:p>
             <a:pPr marL="0" indent="0" algn="ctr">
               <a:buNone/>
             </a:pPr>
             <a:r>
-              <a:rPr lang="en-US" b="1" dirty="0"/>
-              <a:t>SUMMARY:</a:t>
-            </a:r>
-          </a:p>
-          <a:p>
-            <a:pPr algn="just"/>
-            <a:r>
-              <a:rPr lang="en-US" dirty="0"/>
-              <a:t>In this work, they demonstrate that it is possible to discover and learn these synergies from scratch through model-free deep reinforcement learning</a:t>
-            </a:r>
-          </a:p>
-          <a:p>
-            <a:pPr algn="just"/>
-            <a:r>
-              <a:rPr lang="en-US" dirty="0"/>
-              <a:t>Involves training two fully convolutional networks that map from visual observations to actions: one for utility of pushes and another for utility of grasping</a:t>
-            </a:r>
-          </a:p>
-          <a:p>
-            <a:pPr algn="just"/>
-            <a:r>
-              <a:rPr lang="en-US" dirty="0"/>
-              <a:t>Both networks are trained jointly in a Q-learning framework and are entirely self-supervised by trial and error</a:t>
-            </a:r>
-          </a:p>
-          <a:p>
-            <a:pPr algn="just"/>
-            <a:r>
-              <a:rPr lang="en-US" dirty="0"/>
-              <a:t>Rewards are provided from successful grasps</a:t>
-            </a:r>
-          </a:p>
-          <a:p>
-            <a:pPr algn="just"/>
-            <a:r>
-              <a:rPr lang="en-US" dirty="0"/>
-              <a:t>Policy learns pushing motions that enable future grasps due to this reward</a:t>
-            </a:r>
-          </a:p>
-          <a:p>
-            <a:pPr algn="just"/>
-            <a:r>
-              <a:rPr lang="en-US" dirty="0"/>
-              <a:t>Qualitatively tested using  V-Rep simulation and U5</a:t>
-            </a:r>
-          </a:p>
-          <a:p>
-            <a:pPr algn="just"/>
-            <a:r>
-              <a:rPr lang="en-US" dirty="0"/>
-              <a:t>During picking experiments in both simulation and real-world scenarios, we find that our system quickly learns complex behaviors amid challenging cases of clutter</a:t>
-            </a:r>
-            <a:endParaRPr lang="en-IN" dirty="0"/>
+              <a:rPr lang="en-IN" b="1" dirty="0"/>
+              <a:t>Abstract:</a:t>
+            </a:r>
+          </a:p>
+          <a:p>
+            <a:pPr lvl="0" algn="just"/>
+            <a:r>
+              <a:rPr lang="en-IN" dirty="0"/>
+              <a:t>Traditional controllers in such tasks can be inaccurate and need to be manually tuned </a:t>
+            </a:r>
+          </a:p>
+          <a:p>
+            <a:pPr lvl="0" algn="just"/>
+            <a:r>
+              <a:rPr lang="en-IN" dirty="0"/>
+              <a:t>Paper shows that complex insertion tasks can be solved with RL where the goal is natural sparse reward signals (+1 for successful electrical connectivity and 0 if not) and goal images </a:t>
+            </a:r>
+          </a:p>
+          <a:p>
+            <a:endParaRPr lang="en-IN" b="1" dirty="0"/>
           </a:p>
         </p:txBody>
       </p:sp>
     </p:spTree>
     <p:extLst>
       <p:ext uri="{BB962C8B-B14F-4D97-AF65-F5344CB8AC3E}">
-        <p14:creationId xmlns:p14="http://schemas.microsoft.com/office/powerpoint/2010/main" val="3297913472"/>
+        <p14:creationId xmlns:p14="http://schemas.microsoft.com/office/powerpoint/2010/main" val="1496229063"/>
       </p:ext>
     </p:extLst>
   </p:cSld>
@@ -4814,132 +5357,119 @@
       </p:grpSpPr>
       <p:sp>
         <p:nvSpPr>
-          <p:cNvPr id="2" name="Title 1">
-            <a:extLst>
-              <a:ext uri="{FF2B5EF4-FFF2-40B4-BE49-F238E27FC236}">
-                <a16:creationId xmlns:a16="http://schemas.microsoft.com/office/drawing/2014/main" id="{8D93667C-FFF2-4ECB-9D2A-6405D23F0C9C}"/>
-              </a:ext>
-            </a:extLst>
-          </p:cNvPr>
-          <p:cNvSpPr>
-            <a:spLocks noGrp="1"/>
-          </p:cNvSpPr>
-          <p:nvPr>
-            <p:ph type="title"/>
+          <p:cNvPr id="3" name="Content Placeholder 2">
+            <a:extLst>
+              <a:ext uri="{FF2B5EF4-FFF2-40B4-BE49-F238E27FC236}">
+                <a16:creationId xmlns:a16="http://schemas.microsoft.com/office/drawing/2014/main" id="{6BB36001-17E0-454D-98A5-9B56ABCAE6B7}"/>
+              </a:ext>
+            </a:extLst>
+          </p:cNvPr>
+          <p:cNvSpPr>
+            <a:spLocks noGrp="1"/>
+          </p:cNvSpPr>
+          <p:nvPr>
+            <p:ph idx="1"/>
           </p:nvPr>
         </p:nvSpPr>
         <p:spPr/>
         <p:txBody>
-          <a:bodyPr>
-            <a:normAutofit fontScale="90000"/>
-          </a:bodyPr>
-          <a:lstStyle/>
-          <a:p>
-            <a:pPr algn="ctr"/>
+          <a:bodyPr/>
+          <a:lstStyle/>
+          <a:p>
+            <a:pPr marL="0" indent="0" algn="ctr">
+              <a:buNone/>
+            </a:pPr>
             <a:r>
               <a:rPr lang="en-IN" dirty="0"/>
-              <a:t>Paper 5:</a:t>
-            </a:r>
-            <a:r>
-              <a:rPr lang="en-US" dirty="0"/>
-              <a:t>Kinematic analysis and fault-tolerant trajectory planning of space manipulator under a single joint failure</a:t>
-            </a:r>
+              <a:t>Approaches: </a:t>
+            </a:r>
+          </a:p>
+          <a:p>
+            <a:pPr lvl="0" algn="just"/>
             <a:r>
               <a:rPr lang="en-IN" dirty="0"/>
-              <a:t> </a:t>
-            </a:r>
-          </a:p>
-        </p:txBody>
-      </p:sp>
-      <p:sp>
-        <p:nvSpPr>
-          <p:cNvPr id="3" name="Content Placeholder 2">
-            <a:extLst>
-              <a:ext uri="{FF2B5EF4-FFF2-40B4-BE49-F238E27FC236}">
-                <a16:creationId xmlns:a16="http://schemas.microsoft.com/office/drawing/2014/main" id="{BE764CF1-BB48-471E-BC97-495C6B592CAB}"/>
-              </a:ext>
-            </a:extLst>
-          </p:cNvPr>
-          <p:cNvSpPr>
-            <a:spLocks noGrp="1"/>
-          </p:cNvSpPr>
-          <p:nvPr>
-            <p:ph idx="1"/>
-          </p:nvPr>
+              <a:t>End-to-end approach that learns a policy from images (which serve as state representation and goal specification). Visual data also provides robustness to sensor and actuator noise</a:t>
+            </a:r>
+          </a:p>
+          <a:p>
+            <a:pPr lvl="0" algn="just"/>
+            <a:r>
+              <a:rPr lang="en-IN" dirty="0"/>
+              <a:t>Using simple sparse rewards. Sample requirements are reduced by using the prior knowledge on the task. To handle this challenge, we extend the residual RL approach, which learns a parametric policy on top of a fixed, hand-specified controller, to the setting of vision-based manipulation.</a:t>
+            </a:r>
+          </a:p>
+          <a:p>
+            <a:endParaRPr lang="en-IN" dirty="0"/>
+          </a:p>
+        </p:txBody>
+      </p:sp>
+      <p:sp>
+        <p:nvSpPr>
+          <p:cNvPr id="8" name="Title 1">
+            <a:extLst>
+              <a:ext uri="{FF2B5EF4-FFF2-40B4-BE49-F238E27FC236}">
+                <a16:creationId xmlns:a16="http://schemas.microsoft.com/office/drawing/2014/main" id="{71BF62C1-699B-47F9-A63B-B9093E53A61F}"/>
+              </a:ext>
+            </a:extLst>
+          </p:cNvPr>
+          <p:cNvSpPr txBox="1">
+            <a:spLocks/>
+          </p:cNvSpPr>
+          <p:nvPr/>
         </p:nvSpPr>
         <p:spPr>
           <a:xfrm>
-            <a:off x="838200" y="2043666"/>
-            <a:ext cx="10515600" cy="4667250"/>
+            <a:off x="124287" y="681037"/>
+            <a:ext cx="12180163" cy="1009651"/>
           </a:xfrm>
+          <a:prstGeom prst="rect">
+            <a:avLst/>
+          </a:prstGeom>
         </p:spPr>
         <p:txBody>
-          <a:bodyPr>
-            <a:normAutofit fontScale="92500" lnSpcReduction="10000"/>
+          <a:bodyPr vert="horz" lIns="91440" tIns="45720" rIns="91440" bIns="45720" rtlCol="0" anchor="ctr">
+            <a:noAutofit/>
           </a:bodyPr>
-          <a:lstStyle/>
-          <a:p>
-            <a:r>
-              <a:rPr lang="en-IN" dirty="0"/>
-              <a:t>Background of Researchers: </a:t>
-            </a:r>
-            <a:r>
-              <a:rPr lang="en-US" dirty="0"/>
-              <a:t>University of Science and Technology Beijing, Beijing, China</a:t>
-            </a:r>
-          </a:p>
-          <a:p>
-            <a:r>
-              <a:rPr lang="en-IN" dirty="0"/>
-              <a:t>Year of Publication: (2019) </a:t>
-            </a:r>
-            <a:r>
-              <a:rPr lang="en-US" dirty="0"/>
-              <a:t>IEEE Transactions on Systems, Man, and Cybernetics: Systems</a:t>
-            </a:r>
-          </a:p>
-          <a:p>
-            <a:endParaRPr lang="en-US" dirty="0"/>
-          </a:p>
-          <a:p>
-            <a:pPr marL="0" indent="0" algn="ctr">
-              <a:buNone/>
-            </a:pPr>
-            <a:r>
-              <a:rPr lang="en-US" b="1" dirty="0"/>
-              <a:t>ABSTRACT</a:t>
-            </a:r>
-          </a:p>
-          <a:p>
-            <a:pPr algn="just"/>
-            <a:r>
-              <a:rPr lang="en-US" dirty="0"/>
-              <a:t>Article develops a robust fault tolerant (FT) control scheme for an n-link uncertain robotic system with actuator failures</a:t>
-            </a:r>
-          </a:p>
-          <a:p>
-            <a:pPr algn="just"/>
-            <a:r>
-              <a:rPr lang="en-US" dirty="0"/>
-              <a:t>Gaussian radial basis function neural networks (GRBNNs) are used to compensate for the actuator failures</a:t>
-            </a:r>
-          </a:p>
-          <a:p>
-            <a:pPr algn="just"/>
-            <a:r>
-              <a:rPr lang="en-US" dirty="0"/>
-              <a:t>Nonsingular fast terminal sliding mode control (NFTSM) is given, in order to accelerate the recovery of system stability after failure</a:t>
-            </a:r>
-          </a:p>
-          <a:p>
-            <a:endParaRPr lang="en-IN" dirty="0"/>
+          <a:lstStyle>
+            <a:lvl1pPr algn="l" defTabSz="914400" rtl="0" eaLnBrk="1" latinLnBrk="0" hangingPunct="1">
+              <a:lnSpc>
+                <a:spcPct val="90000"/>
+              </a:lnSpc>
+              <a:spcBef>
+                <a:spcPct val="0"/>
+              </a:spcBef>
+              <a:buNone/>
+              <a:defRPr sz="4400" kern="1200">
+                <a:solidFill>
+                  <a:schemeClr val="tx1"/>
+                </a:solidFill>
+                <a:latin typeface="+mj-lt"/>
+                <a:ea typeface="+mj-ea"/>
+                <a:cs typeface="+mj-cs"/>
+              </a:defRPr>
+            </a:lvl1pPr>
+          </a:lstStyle>
+          <a:p>
+            <a:pPr algn="ctr"/>
+            <a:r>
+              <a:rPr lang="en-IN" sz="4000" dirty="0"/>
+              <a:t>Paper 5: </a:t>
+            </a:r>
+            <a:r>
+              <a:rPr lang="en-US" sz="4000" dirty="0"/>
+              <a:t>Deep Reinforcement Learning for Industrial Insertion Tasks with Visual Inputs and Natural Rewards</a:t>
+            </a:r>
+            <a:br>
+              <a:rPr lang="en-US" sz="4000" dirty="0"/>
+            </a:br>
+            <a:endParaRPr lang="en-IN" sz="4000" dirty="0"/>
           </a:p>
         </p:txBody>
       </p:sp>
     </p:spTree>
     <p:extLst>
       <p:ext uri="{BB962C8B-B14F-4D97-AF65-F5344CB8AC3E}">
-        <p14:creationId xmlns:p14="http://schemas.microsoft.com/office/powerpoint/2010/main" val="1223955637"/>
+        <p14:creationId xmlns:p14="http://schemas.microsoft.com/office/powerpoint/2010/main" val="1991862517"/>
       </p:ext>
     </p:extLst>
   </p:cSld>
@@ -4955,7 +5485,7 @@
     <p:bg>
       <p:bgPr>
         <a:solidFill>
-          <a:schemeClr val="tx1"/>
+          <a:schemeClr val="bg1"/>
         </a:solidFill>
         <a:effectLst/>
       </p:bgPr>
@@ -4976,196 +5506,73 @@
       </p:grpSpPr>
       <p:sp>
         <p:nvSpPr>
-          <p:cNvPr id="10" name="Rectangle 9">
-            <a:extLst>
-              <a:ext uri="{FF2B5EF4-FFF2-40B4-BE49-F238E27FC236}">
-                <a16:creationId xmlns:a16="http://schemas.microsoft.com/office/drawing/2014/main" id="{867D4867-5BA7-4462-B2F6-A23F4A622AA7}"/>
-              </a:ext>
-              <a:ext uri="{C183D7F6-B498-43B3-948B-1728B52AA6E4}">
-                <adec:decorative xmlns:adec="http://schemas.microsoft.com/office/drawing/2017/decorative" val="1"/>
-              </a:ext>
-            </a:extLst>
-          </p:cNvPr>
-          <p:cNvSpPr>
-            <a:spLocks noGrp="1" noRot="1" noChangeAspect="1" noMove="1" noResize="1" noEditPoints="1" noAdjustHandles="1" noChangeArrowheads="1" noChangeShapeType="1" noTextEdit="1"/>
-          </p:cNvSpPr>
-          <p:nvPr>
-            <p:extLst>
-              <p:ext uri="{386F3935-93C4-4BCD-93E2-E3B085C9AB24}">
-                <p16:designElem xmlns:p16="http://schemas.microsoft.com/office/powerpoint/2015/main" val="1"/>
-              </p:ext>
-            </p:extLst>
-          </p:nvPr>
+          <p:cNvPr id="4" name="Title 1">
+            <a:extLst>
+              <a:ext uri="{FF2B5EF4-FFF2-40B4-BE49-F238E27FC236}">
+                <a16:creationId xmlns:a16="http://schemas.microsoft.com/office/drawing/2014/main" id="{482B0FC5-1E2B-425A-8C9A-F07B61580619}"/>
+              </a:ext>
+            </a:extLst>
+          </p:cNvPr>
+          <p:cNvSpPr txBox="1">
+            <a:spLocks/>
+          </p:cNvSpPr>
+          <p:nvPr/>
         </p:nvSpPr>
         <p:spPr>
           <a:xfrm>
-            <a:off x="0" y="0"/>
-            <a:ext cx="4654296" cy="6858000"/>
+            <a:off x="481013" y="3752849"/>
+            <a:ext cx="3290887" cy="2452687"/>
           </a:xfrm>
           <a:prstGeom prst="rect">
             <a:avLst/>
           </a:prstGeom>
-          <a:solidFill>
-            <a:srgbClr val="3F3F3F"/>
-          </a:solidFill>
-          <a:ln>
-            <a:noFill/>
-          </a:ln>
         </p:spPr>
-        <p:style>
-          <a:lnRef idx="0">
-            <a:scrgbClr r="0" g="0" b="0"/>
-          </a:lnRef>
-          <a:fillRef idx="0">
-            <a:scrgbClr r="0" g="0" b="0"/>
-          </a:fillRef>
-          <a:effectRef idx="0">
-            <a:scrgbClr r="0" g="0" b="0"/>
-          </a:effectRef>
-          <a:fontRef idx="minor">
-            <a:schemeClr val="lt1"/>
-          </a:fontRef>
-        </p:style>
-        <p:txBody>
-          <a:bodyPr rtlCol="0" anchor="ctr"/>
-          <a:lstStyle/>
-          <a:p>
-            <a:pPr algn="ctr"/>
-            <a:endParaRPr lang="en-US" dirty="0"/>
-          </a:p>
-        </p:txBody>
-      </p:sp>
-      <p:sp>
-        <p:nvSpPr>
-          <p:cNvPr id="2" name="Title 1">
-            <a:extLst>
-              <a:ext uri="{FF2B5EF4-FFF2-40B4-BE49-F238E27FC236}">
-                <a16:creationId xmlns:a16="http://schemas.microsoft.com/office/drawing/2014/main" id="{7D9B30E9-8E11-4BDD-A983-BFBD47820E7A}"/>
-              </a:ext>
-            </a:extLst>
-          </p:cNvPr>
-          <p:cNvSpPr>
-            <a:spLocks noGrp="1"/>
-          </p:cNvSpPr>
-          <p:nvPr>
-            <p:ph type="title"/>
-          </p:nvPr>
-        </p:nvSpPr>
-        <p:spPr>
-          <a:xfrm>
-            <a:off x="643468" y="623392"/>
-            <a:ext cx="3363974" cy="1607060"/>
-          </a:xfrm>
-          <a:noFill/>
-          <a:ln w="19050">
-            <a:solidFill>
-              <a:schemeClr val="tx1"/>
-            </a:solidFill>
-          </a:ln>
-        </p:spPr>
-        <p:txBody>
-          <a:bodyPr wrap="square" anchor="ctr">
+        <p:txBody>
+          <a:bodyPr vert="horz" lIns="91440" tIns="45720" rIns="91440" bIns="45720" rtlCol="0" anchor="ctr">
             <a:normAutofit/>
           </a:bodyPr>
-          <a:lstStyle/>
-          <a:p>
-            <a:pPr algn="ctr"/>
-            <a:r>
-              <a:rPr lang="en-IN" sz="2200" dirty="0"/>
-              <a:t>Paper 5:</a:t>
-            </a:r>
-            <a:r>
-              <a:rPr lang="en-US" sz="2200" dirty="0"/>
-              <a:t>Kinematic analysis and fault-tolerant trajectory planning of space manipulator under a single joint failure</a:t>
-            </a:r>
-            <a:r>
-              <a:rPr lang="en-IN" sz="2200" dirty="0"/>
-              <a:t> </a:t>
-            </a:r>
-          </a:p>
-        </p:txBody>
-      </p:sp>
-      <p:sp>
-        <p:nvSpPr>
-          <p:cNvPr id="3" name="Content Placeholder 2">
-            <a:extLst>
-              <a:ext uri="{FF2B5EF4-FFF2-40B4-BE49-F238E27FC236}">
-                <a16:creationId xmlns:a16="http://schemas.microsoft.com/office/drawing/2014/main" id="{10DC4EB3-51E6-4AFE-886E-D66C07B161F5}"/>
-              </a:ext>
-            </a:extLst>
-          </p:cNvPr>
-          <p:cNvSpPr>
-            <a:spLocks noGrp="1"/>
-          </p:cNvSpPr>
-          <p:nvPr>
-            <p:ph idx="1"/>
-          </p:nvPr>
-        </p:nvSpPr>
-        <p:spPr>
-          <a:xfrm>
-            <a:off x="559293" y="2352583"/>
-            <a:ext cx="3542189" cy="4505417"/>
-          </a:xfrm>
-        </p:spPr>
-        <p:txBody>
-          <a:bodyPr>
-            <a:normAutofit lnSpcReduction="10000"/>
-          </a:bodyPr>
-          <a:lstStyle/>
-          <a:p>
-            <a:pPr marL="0" indent="0" algn="ctr">
-              <a:buNone/>
+          <a:lstStyle>
+            <a:lvl1pPr algn="l" defTabSz="914400" rtl="0" eaLnBrk="1" latinLnBrk="0" hangingPunct="1">
+              <a:lnSpc>
+                <a:spcPct val="90000"/>
+              </a:lnSpc>
+              <a:spcBef>
+                <a:spcPct val="0"/>
+              </a:spcBef>
+              <a:buNone/>
+              <a:defRPr sz="4400" kern="1200">
+                <a:solidFill>
+                  <a:schemeClr val="tx1"/>
+                </a:solidFill>
+                <a:latin typeface="+mj-lt"/>
+                <a:ea typeface="+mj-ea"/>
+                <a:cs typeface="+mj-cs"/>
+              </a:defRPr>
+            </a:lvl1pPr>
+          </a:lstStyle>
+          <a:p>
+            <a:pPr>
+              <a:spcAft>
+                <a:spcPts val="600"/>
+              </a:spcAft>
             </a:pPr>
             <a:r>
-              <a:rPr lang="en-IN" sz="1900" b="1" dirty="0"/>
-              <a:t>EXPERIMENT AND RESULTS</a:t>
-            </a:r>
-          </a:p>
-          <a:p>
-            <a:pPr marL="0" indent="0">
-              <a:buNone/>
-            </a:pPr>
-            <a:endParaRPr lang="en-IN" sz="1900" b="1" dirty="0"/>
-          </a:p>
-          <a:p>
-            <a:pPr algn="just"/>
-            <a:r>
-              <a:rPr lang="en-US" sz="1900" dirty="0"/>
-              <a:t>Controller tested on the Baxter robot with seven joints</a:t>
-            </a:r>
-          </a:p>
-          <a:p>
-            <a:pPr algn="just"/>
-            <a:r>
-              <a:rPr lang="en-US" sz="1900" dirty="0"/>
-              <a:t>NFTSM has increased the robustness of the system, accelerated the convergence speed and shortened the convergence time</a:t>
-            </a:r>
-          </a:p>
-          <a:p>
-            <a:pPr algn="just"/>
-            <a:r>
-              <a:rPr lang="en-US" sz="1900" dirty="0"/>
-              <a:t>In future work, they will introduce constraints to prevent ‘state-jump’ caused by abrupt faults, which results in large scale oscillations of the manipulator</a:t>
-            </a:r>
-          </a:p>
-          <a:p>
-            <a:pPr algn="just"/>
-            <a:endParaRPr lang="en-US" sz="1900" dirty="0"/>
-          </a:p>
-          <a:p>
-            <a:endParaRPr lang="en-US" sz="1900" b="1" dirty="0"/>
-          </a:p>
-          <a:p>
-            <a:endParaRPr lang="en-IN" sz="1900" b="1" dirty="0"/>
+              <a:rPr lang="en-US" sz="2500"/>
+              <a:t>Paper 5: Deep Reinforcement Learning for Industrial Insertion Tasks with Visual Inputs and Natural Rewards</a:t>
+            </a:r>
+            <a:br>
+              <a:rPr lang="en-US" sz="2500"/>
+            </a:br>
+            <a:endParaRPr lang="en-US" sz="2500"/>
           </a:p>
         </p:txBody>
       </p:sp>
       <p:pic>
         <p:nvPicPr>
-          <p:cNvPr id="5" name="Picture 4" descr="A screenshot of a cell phone&#10;&#10;Description automatically generated">
-            <a:extLst>
-              <a:ext uri="{FF2B5EF4-FFF2-40B4-BE49-F238E27FC236}">
-                <a16:creationId xmlns:a16="http://schemas.microsoft.com/office/drawing/2014/main" id="{4A8D48AE-4508-4605-9642-32CB11DFA5B6}"/>
+          <p:cNvPr id="6" name="Picture 5" descr="A picture containing photo, table, sitting, computer&#10;&#10;Description automatically generated">
+            <a:extLst>
+              <a:ext uri="{FF2B5EF4-FFF2-40B4-BE49-F238E27FC236}">
+                <a16:creationId xmlns:a16="http://schemas.microsoft.com/office/drawing/2014/main" id="{7489D8FF-6503-4104-8F88-5405C9FE9338}"/>
               </a:ext>
             </a:extLst>
           </p:cNvPr>
@@ -5174,7 +5581,7 @@
           </p:cNvPicPr>
           <p:nvPr/>
         </p:nvPicPr>
-        <p:blipFill>
+        <p:blipFill rotWithShape="1">
           <a:blip r:embed="rId2">
             <a:extLst>
               <a:ext uri="{28A0092B-C50C-407E-A947-70E740481C1C}">
@@ -5182,29 +5589,175 @@
               </a:ext>
             </a:extLst>
           </a:blip>
-          <a:stretch>
-            <a:fillRect/>
-          </a:stretch>
+          <a:srcRect t="16617"/>
+          <a:stretch/>
         </p:blipFill>
         <p:spPr>
           <a:xfrm>
-            <a:off x="5751861" y="643467"/>
-            <a:ext cx="5342572" cy="5410199"/>
+            <a:off x="20" y="10"/>
+            <a:ext cx="12191980" cy="3710603"/>
           </a:xfrm>
-          <a:prstGeom prst="rect">
+          <a:custGeom>
             <a:avLst/>
-          </a:prstGeom>
+            <a:gdLst>
+              <a:gd name="connsiteX0" fmla="*/ 0 w 12192000"/>
+              <a:gd name="connsiteY0" fmla="*/ 0 h 3692092"/>
+              <a:gd name="connsiteX1" fmla="*/ 12192000 w 12192000"/>
+              <a:gd name="connsiteY1" fmla="*/ 0 h 3692092"/>
+              <a:gd name="connsiteX2" fmla="*/ 12192000 w 12192000"/>
+              <a:gd name="connsiteY2" fmla="*/ 3504824 h 3692092"/>
+              <a:gd name="connsiteX3" fmla="*/ 12024691 w 12192000"/>
+              <a:gd name="connsiteY3" fmla="*/ 3517794 h 3692092"/>
+              <a:gd name="connsiteX4" fmla="*/ 160485 w 12192000"/>
+              <a:gd name="connsiteY4" fmla="*/ 3663863 h 3692092"/>
+              <a:gd name="connsiteX5" fmla="*/ 0 w 12192000"/>
+              <a:gd name="connsiteY5" fmla="*/ 3692092 h 3692092"/>
+            </a:gdLst>
+            <a:ahLst/>
+            <a:cxnLst>
+              <a:cxn ang="0">
+                <a:pos x="connsiteX0" y="connsiteY0"/>
+              </a:cxn>
+              <a:cxn ang="0">
+                <a:pos x="connsiteX1" y="connsiteY1"/>
+              </a:cxn>
+              <a:cxn ang="0">
+                <a:pos x="connsiteX2" y="connsiteY2"/>
+              </a:cxn>
+              <a:cxn ang="0">
+                <a:pos x="connsiteX3" y="connsiteY3"/>
+              </a:cxn>
+              <a:cxn ang="0">
+                <a:pos x="connsiteX4" y="connsiteY4"/>
+              </a:cxn>
+              <a:cxn ang="0">
+                <a:pos x="connsiteX5" y="connsiteY5"/>
+              </a:cxn>
+            </a:cxnLst>
+            <a:rect l="l" t="t" r="r" b="b"/>
+            <a:pathLst>
+              <a:path w="12192000" h="3692092">
+                <a:moveTo>
+                  <a:pt x="0" y="0"/>
+                </a:moveTo>
+                <a:lnTo>
+                  <a:pt x="12192000" y="0"/>
+                </a:lnTo>
+                <a:lnTo>
+                  <a:pt x="12192000" y="3504824"/>
+                </a:lnTo>
+                <a:lnTo>
+                  <a:pt x="12024691" y="3517794"/>
+                </a:lnTo>
+                <a:cubicBezTo>
+                  <a:pt x="8077523" y="3783195"/>
+                  <a:pt x="4094678" y="3026959"/>
+                  <a:pt x="160485" y="3663863"/>
+                </a:cubicBezTo>
+                <a:lnTo>
+                  <a:pt x="0" y="3692092"/>
+                </a:lnTo>
+                <a:close/>
+              </a:path>
+            </a:pathLst>
+          </a:custGeom>
         </p:spPr>
       </p:pic>
+      <p:sp>
+        <p:nvSpPr>
+          <p:cNvPr id="3" name="Content Placeholder 2">
+            <a:extLst>
+              <a:ext uri="{FF2B5EF4-FFF2-40B4-BE49-F238E27FC236}">
+                <a16:creationId xmlns:a16="http://schemas.microsoft.com/office/drawing/2014/main" id="{E33EA7CB-324F-4D38-9963-6EAFD8C55C02}"/>
+              </a:ext>
+            </a:extLst>
+          </p:cNvPr>
+          <p:cNvSpPr>
+            <a:spLocks noGrp="1"/>
+          </p:cNvSpPr>
+          <p:nvPr>
+            <p:ph idx="1"/>
+          </p:nvPr>
+        </p:nvSpPr>
+        <p:spPr>
+          <a:xfrm>
+            <a:off x="4171950" y="3752850"/>
+            <a:ext cx="7537445" cy="3105140"/>
+          </a:xfrm>
+        </p:spPr>
+        <p:txBody>
+          <a:bodyPr vert="horz" lIns="91440" tIns="45720" rIns="91440" bIns="45720" rtlCol="0" anchor="ctr">
+            <a:normAutofit lnSpcReduction="10000"/>
+          </a:bodyPr>
+          <a:lstStyle/>
+          <a:p>
+            <a:pPr marL="0"/>
+            <a:r>
+              <a:rPr lang="en-US" sz="1600" b="1" dirty="0"/>
+              <a:t>EXPERIMENTS: </a:t>
+            </a:r>
+          </a:p>
+          <a:p>
+            <a:pPr lvl="0"/>
+            <a:r>
+              <a:rPr lang="en-US" sz="1600" dirty="0"/>
+              <a:t>Residual RL with easy-to-obtain reward signals</a:t>
+            </a:r>
+          </a:p>
+          <a:p>
+            <a:pPr lvl="0"/>
+            <a:r>
+              <a:rPr lang="en-US" sz="1600" dirty="0"/>
+              <a:t>Two types of natural rewards that are intuitive for users to provide: an image directly specifying a goal and a binary sparse reward indicating success.</a:t>
+            </a:r>
+          </a:p>
+          <a:p>
+            <a:pPr marL="0" lvl="0"/>
+            <a:r>
+              <a:rPr lang="en-US" sz="1600" dirty="0"/>
+              <a:t>Questions to be answered: </a:t>
+            </a:r>
+          </a:p>
+          <a:p>
+            <a:pPr marL="0"/>
+            <a:endParaRPr lang="en-US" sz="1600" dirty="0"/>
+          </a:p>
+          <a:p>
+            <a:pPr marL="0" lvl="0" indent="0">
+              <a:buNone/>
+            </a:pPr>
+            <a:r>
+              <a:rPr lang="en-US" sz="1600" dirty="0"/>
+              <a:t>(1) Can such trained policies provide comparable performance to policies that are trained with densely-shaped rewards?</a:t>
+            </a:r>
+          </a:p>
+          <a:p>
+            <a:pPr marL="0"/>
+            <a:endParaRPr lang="en-US" sz="1600" dirty="0"/>
+          </a:p>
+          <a:p>
+            <a:pPr marL="0" lvl="0" indent="0">
+              <a:buNone/>
+            </a:pPr>
+            <a:r>
+              <a:rPr lang="en-US" sz="1600" dirty="0"/>
+              <a:t>(2) Are these trained policies robust to small variations and noise?</a:t>
+            </a:r>
+          </a:p>
+          <a:p>
+            <a:endParaRPr lang="en-US" sz="1100" dirty="0"/>
+          </a:p>
+        </p:txBody>
+      </p:sp>
     </p:spTree>
     <p:extLst>
       <p:ext uri="{BB962C8B-B14F-4D97-AF65-F5344CB8AC3E}">
-        <p14:creationId xmlns:p14="http://schemas.microsoft.com/office/powerpoint/2010/main" val="2306586086"/>
+        <p14:creationId xmlns:p14="http://schemas.microsoft.com/office/powerpoint/2010/main" val="1578034153"/>
       </p:ext>
     </p:extLst>
   </p:cSld>
   <p:clrMapOvr>
-    <a:overrideClrMapping bg1="dk1" tx1="lt1" bg2="dk2" tx2="lt2" accent1="accent1" accent2="accent2" accent3="accent3" accent4="accent4" accent5="accent5" accent6="accent6" hlink="hlink" folHlink="folHlink"/>
+    <a:masterClrMapping/>
   </p:clrMapOvr>
 </p:sld>
 </file>
@@ -5228,72 +5781,138 @@
       </p:grpSpPr>
       <p:sp>
         <p:nvSpPr>
-          <p:cNvPr id="2" name="Title 1">
-            <a:extLst>
-              <a:ext uri="{FF2B5EF4-FFF2-40B4-BE49-F238E27FC236}">
-                <a16:creationId xmlns:a16="http://schemas.microsoft.com/office/drawing/2014/main" id="{0A200D46-9445-434F-A8D8-409AEC98314A}"/>
-              </a:ext>
-            </a:extLst>
-          </p:cNvPr>
-          <p:cNvSpPr>
-            <a:spLocks noGrp="1"/>
-          </p:cNvSpPr>
-          <p:nvPr>
-            <p:ph type="title"/>
-          </p:nvPr>
-        </p:nvSpPr>
-        <p:spPr/>
+          <p:cNvPr id="3" name="Content Placeholder 2">
+            <a:extLst>
+              <a:ext uri="{FF2B5EF4-FFF2-40B4-BE49-F238E27FC236}">
+                <a16:creationId xmlns:a16="http://schemas.microsoft.com/office/drawing/2014/main" id="{6D5496D6-F122-4514-9C0A-D633A36CBCAC}"/>
+              </a:ext>
+            </a:extLst>
+          </p:cNvPr>
+          <p:cNvSpPr>
+            <a:spLocks noGrp="1"/>
+          </p:cNvSpPr>
+          <p:nvPr>
+            <p:ph idx="1"/>
+          </p:nvPr>
+        </p:nvSpPr>
+        <p:spPr>
+          <a:xfrm>
+            <a:off x="838199" y="1825624"/>
+            <a:ext cx="10906957" cy="4850383"/>
+          </a:xfrm>
+        </p:spPr>
         <p:txBody>
           <a:bodyPr>
-            <a:normAutofit fontScale="90000"/>
+            <a:normAutofit/>
           </a:bodyPr>
           <a:lstStyle/>
           <a:p>
+            <a:pPr marL="0" indent="0" algn="ctr">
+              <a:buNone/>
+            </a:pPr>
+            <a:r>
+              <a:rPr lang="en-IN" b="1" dirty="0"/>
+              <a:t>RESULTS:</a:t>
+            </a:r>
+          </a:p>
+          <a:p>
+            <a:pPr lvl="0" algn="just"/>
+            <a:r>
+              <a:rPr lang="en-IN" dirty="0"/>
+              <a:t>Experiments show that a </a:t>
+            </a:r>
+            <a:r>
+              <a:rPr lang="en-IN" b="1" dirty="0"/>
+              <a:t>successful and consistent vision-based insertion policy</a:t>
+            </a:r>
+            <a:r>
+              <a:rPr lang="en-IN" dirty="0"/>
+              <a:t> can be learned from relatively few samples using residual RL.</a:t>
+            </a:r>
+          </a:p>
+          <a:p>
+            <a:pPr lvl="0" algn="just"/>
+            <a:r>
+              <a:rPr lang="en-IN" dirty="0"/>
+              <a:t>All methods are able to achieve very high success rates in the sparse setting.</a:t>
+            </a:r>
+          </a:p>
+          <a:p>
+            <a:pPr lvl="0" algn="just"/>
+            <a:r>
+              <a:rPr lang="en-IN" dirty="0"/>
+              <a:t>Results of the experiment with sparse rewards outperforms standard RL having perfect state information, with standard RL exhibiting only initial performance superiority. </a:t>
+            </a:r>
+          </a:p>
+        </p:txBody>
+      </p:sp>
+      <p:sp>
+        <p:nvSpPr>
+          <p:cNvPr id="4" name="Title 1">
+            <a:extLst>
+              <a:ext uri="{FF2B5EF4-FFF2-40B4-BE49-F238E27FC236}">
+                <a16:creationId xmlns:a16="http://schemas.microsoft.com/office/drawing/2014/main" id="{CAB2915A-6AFD-4729-89ED-686A75BCA3B9}"/>
+              </a:ext>
+            </a:extLst>
+          </p:cNvPr>
+          <p:cNvSpPr txBox="1">
+            <a:spLocks/>
+          </p:cNvSpPr>
+          <p:nvPr/>
+        </p:nvSpPr>
+        <p:spPr>
+          <a:xfrm>
+            <a:off x="124287" y="681037"/>
+            <a:ext cx="12180163" cy="1009651"/>
+          </a:xfrm>
+          <a:prstGeom prst="rect">
+            <a:avLst/>
+          </a:prstGeom>
+        </p:spPr>
+        <p:txBody>
+          <a:bodyPr vert="horz" lIns="91440" tIns="45720" rIns="91440" bIns="45720" rtlCol="0" anchor="ctr">
+            <a:noAutofit/>
+          </a:bodyPr>
+          <a:lstStyle>
+            <a:lvl1pPr algn="l" defTabSz="914400" rtl="0" eaLnBrk="1" latinLnBrk="0" hangingPunct="1">
+              <a:lnSpc>
+                <a:spcPct val="90000"/>
+              </a:lnSpc>
+              <a:spcBef>
+                <a:spcPct val="0"/>
+              </a:spcBef>
+              <a:buNone/>
+              <a:defRPr sz="4400" kern="1200">
+                <a:solidFill>
+                  <a:schemeClr val="tx1"/>
+                </a:solidFill>
+                <a:latin typeface="+mj-lt"/>
+                <a:ea typeface="+mj-ea"/>
+                <a:cs typeface="+mj-cs"/>
+              </a:defRPr>
+            </a:lvl1pPr>
+          </a:lstStyle>
+          <a:p>
             <a:pPr algn="ctr"/>
             <a:r>
-              <a:rPr lang="en-IN" dirty="0"/>
-              <a:t>Paper 6: </a:t>
-            </a:r>
-            <a:r>
-              <a:rPr lang="en-US" dirty="0"/>
-              <a:t>Shallow-Depth Insertion: Peg in Shallow Hole </a:t>
-            </a:r>
-            <a:r>
-              <a:rPr lang="en-IN" dirty="0"/>
-              <a:t>Through Robotic In-Hand Manipulation</a:t>
-            </a:r>
-          </a:p>
-        </p:txBody>
-      </p:sp>
-      <p:sp>
-        <p:nvSpPr>
-          <p:cNvPr id="3" name="Content Placeholder 2">
-            <a:extLst>
-              <a:ext uri="{FF2B5EF4-FFF2-40B4-BE49-F238E27FC236}">
-                <a16:creationId xmlns:a16="http://schemas.microsoft.com/office/drawing/2014/main" id="{A876DD38-B956-48B9-9544-D93961EFD516}"/>
-              </a:ext>
-            </a:extLst>
-          </p:cNvPr>
-          <p:cNvSpPr>
-            <a:spLocks noGrp="1"/>
-          </p:cNvSpPr>
-          <p:nvPr>
-            <p:ph idx="1"/>
-          </p:nvPr>
-        </p:nvSpPr>
-        <p:spPr/>
-        <p:txBody>
-          <a:bodyPr/>
-          <a:lstStyle/>
-          <a:p>
-            <a:endParaRPr lang="en-IN" dirty="0"/>
+              <a:rPr lang="en-IN" sz="4000" dirty="0"/>
+              <a:t>Paper 5: </a:t>
+            </a:r>
+            <a:r>
+              <a:rPr lang="en-US" sz="4000" dirty="0"/>
+              <a:t>Deep Reinforcement Learning for Industrial Insertion Tasks with Visual Inputs and Natural Rewards</a:t>
+            </a:r>
+            <a:br>
+              <a:rPr lang="en-US" sz="4000" dirty="0"/>
+            </a:br>
+            <a:endParaRPr lang="en-IN" sz="4000" dirty="0"/>
           </a:p>
         </p:txBody>
       </p:sp>
     </p:spTree>
     <p:extLst>
       <p:ext uri="{BB962C8B-B14F-4D97-AF65-F5344CB8AC3E}">
-        <p14:creationId xmlns:p14="http://schemas.microsoft.com/office/powerpoint/2010/main" val="3762533633"/>
+        <p14:creationId xmlns:p14="http://schemas.microsoft.com/office/powerpoint/2010/main" val="3330168104"/>
       </p:ext>
     </p:extLst>
   </p:cSld>
@@ -5478,6 +6097,134 @@
           <p:cNvPr id="2" name="Title 1">
             <a:extLst>
               <a:ext uri="{FF2B5EF4-FFF2-40B4-BE49-F238E27FC236}">
+                <a16:creationId xmlns:a16="http://schemas.microsoft.com/office/drawing/2014/main" id="{775E3AD1-ACAF-4BEF-9CF7-FCEF91E0A430}"/>
+              </a:ext>
+            </a:extLst>
+          </p:cNvPr>
+          <p:cNvSpPr>
+            <a:spLocks noGrp="1"/>
+          </p:cNvSpPr>
+          <p:nvPr>
+            <p:ph type="title"/>
+          </p:nvPr>
+        </p:nvSpPr>
+        <p:spPr>
+          <a:xfrm>
+            <a:off x="838200" y="796200"/>
+            <a:ext cx="10515600" cy="1325563"/>
+          </a:xfrm>
+        </p:spPr>
+        <p:txBody>
+          <a:bodyPr>
+            <a:normAutofit fontScale="90000"/>
+          </a:bodyPr>
+          <a:lstStyle/>
+          <a:p>
+            <a:pPr algn="ctr"/>
+            <a:r>
+              <a:rPr lang="en-IN" dirty="0"/>
+              <a:t>Paper 5: </a:t>
+            </a:r>
+            <a:r>
+              <a:rPr lang="en-US" dirty="0"/>
+              <a:t>Deep Reinforcement Learning for Industrial Insertion Tasks with Visual Inputs and Natural Rewards</a:t>
+            </a:r>
+            <a:br>
+              <a:rPr lang="en-US" dirty="0"/>
+            </a:br>
+            <a:br>
+              <a:rPr lang="en-IN" dirty="0"/>
+            </a:br>
+            <a:endParaRPr lang="en-IN" dirty="0"/>
+          </a:p>
+        </p:txBody>
+      </p:sp>
+      <p:sp>
+        <p:nvSpPr>
+          <p:cNvPr id="3" name="Content Placeholder 2">
+            <a:extLst>
+              <a:ext uri="{FF2B5EF4-FFF2-40B4-BE49-F238E27FC236}">
+                <a16:creationId xmlns:a16="http://schemas.microsoft.com/office/drawing/2014/main" id="{D74CFF7E-4B51-4939-B81E-CB39188A9BA1}"/>
+              </a:ext>
+            </a:extLst>
+          </p:cNvPr>
+          <p:cNvSpPr>
+            <a:spLocks noGrp="1"/>
+          </p:cNvSpPr>
+          <p:nvPr>
+            <p:ph idx="1"/>
+          </p:nvPr>
+        </p:nvSpPr>
+        <p:spPr>
+          <a:xfrm>
+            <a:off x="838200" y="2121763"/>
+            <a:ext cx="10515600" cy="4055200"/>
+          </a:xfrm>
+        </p:spPr>
+        <p:txBody>
+          <a:bodyPr/>
+          <a:lstStyle/>
+          <a:p>
+            <a:pPr marL="0" indent="0" algn="ctr">
+              <a:buNone/>
+            </a:pPr>
+            <a:r>
+              <a:rPr lang="en-IN" b="1" dirty="0"/>
+              <a:t>Future Work</a:t>
+            </a:r>
+          </a:p>
+          <a:p>
+            <a:r>
+              <a:rPr lang="en-IN" dirty="0"/>
+              <a:t>Focusing on multi-stage assembly tasks through vision for flexible manufacturing</a:t>
+            </a:r>
+          </a:p>
+          <a:p>
+            <a:r>
+              <a:rPr lang="en-IN" dirty="0"/>
+              <a:t>Multi-step tasks involve adapting to previous mistakes or inaccuracies, which could be difficult but should be able to be handled by RL. </a:t>
+            </a:r>
+          </a:p>
+          <a:p>
+            <a:endParaRPr lang="en-IN" b="1" dirty="0"/>
+          </a:p>
+        </p:txBody>
+      </p:sp>
+    </p:spTree>
+    <p:extLst>
+      <p:ext uri="{BB962C8B-B14F-4D97-AF65-F5344CB8AC3E}">
+        <p14:creationId xmlns:p14="http://schemas.microsoft.com/office/powerpoint/2010/main" val="2756968861"/>
+      </p:ext>
+    </p:extLst>
+  </p:cSld>
+  <p:clrMapOvr>
+    <a:masterClrMapping/>
+  </p:clrMapOvr>
+</p:sld>
+</file>
+
+<file path=ppt/slides/slide21.xml><?xml version="1.0" encoding="utf-8"?>
+<p:sld xmlns:a="http://schemas.openxmlformats.org/drawingml/2006/main" xmlns:r="http://schemas.openxmlformats.org/officeDocument/2006/relationships" xmlns:p="http://schemas.openxmlformats.org/presentationml/2006/main">
+  <p:cSld>
+    <p:spTree>
+      <p:nvGrpSpPr>
+        <p:cNvPr id="1" name=""/>
+        <p:cNvGrpSpPr/>
+        <p:nvPr/>
+      </p:nvGrpSpPr>
+      <p:grpSpPr>
+        <a:xfrm>
+          <a:off x="0" y="0"/>
+          <a:ext cx="0" cy="0"/>
+          <a:chOff x="0" y="0"/>
+          <a:chExt cx="0" cy="0"/>
+        </a:xfrm>
+      </p:grpSpPr>
+      <p:sp>
+        <p:nvSpPr>
+          <p:cNvPr id="2" name="Title 1">
+            <a:extLst>
+              <a:ext uri="{FF2B5EF4-FFF2-40B4-BE49-F238E27FC236}">
                 <a16:creationId xmlns:a16="http://schemas.microsoft.com/office/drawing/2014/main" id="{31E0C506-D3F3-4E92-B52F-3593DC7F2561}"/>
               </a:ext>
             </a:extLst>
@@ -5531,7 +6278,22 @@
             <a:pPr algn="just"/>
             <a:r>
               <a:rPr lang="en-IN" dirty="0"/>
-              <a:t>Implement zero-shot visual imitation on Multi-Object Manipulation to stack alphabetic blocks in a tower of given order using </a:t>
+              <a:t>Implement zero-shot visual imitation on Multi-Object Manipulation &amp; assembly</a:t>
+            </a:r>
+          </a:p>
+          <a:p>
+            <a:pPr algn="just"/>
+            <a:r>
+              <a:rPr lang="en-IN" dirty="0"/>
+              <a:t>Reproduce these results using simulated model of </a:t>
+            </a:r>
+            <a:r>
+              <a:rPr lang="en-IN" dirty="0" err="1"/>
+              <a:t>Dobot</a:t>
+            </a:r>
+            <a:r>
+              <a:rPr lang="en-IN" dirty="0"/>
+              <a:t> Magician (ROS linked with </a:t>
             </a:r>
             <a:r>
               <a:rPr lang="en-IN" dirty="0" err="1"/>
@@ -5539,42 +6301,6 @@
             </a:r>
             <a:r>
               <a:rPr lang="en-IN" dirty="0"/>
-              <a:t> gym and </a:t>
-            </a:r>
-            <a:r>
-              <a:rPr lang="en-IN" dirty="0" err="1"/>
-              <a:t>FetchPickAndPlace</a:t>
-            </a:r>
-            <a:r>
-              <a:rPr lang="en-IN" dirty="0"/>
-              <a:t> on </a:t>
-            </a:r>
-            <a:r>
-              <a:rPr lang="en-IN" dirty="0" err="1"/>
-              <a:t>MuJoCo</a:t>
-            </a:r>
-            <a:endParaRPr lang="en-IN" dirty="0"/>
-          </a:p>
-          <a:p>
-            <a:pPr algn="just"/>
-            <a:r>
-              <a:rPr lang="en-IN" dirty="0"/>
-              <a:t>Reproduce these results using simulated model of </a:t>
-            </a:r>
-            <a:r>
-              <a:rPr lang="en-IN" dirty="0" err="1"/>
-              <a:t>Dobot</a:t>
-            </a:r>
-            <a:r>
-              <a:rPr lang="en-IN" dirty="0"/>
-              <a:t> Magician (ROS linked with </a:t>
-            </a:r>
-            <a:r>
-              <a:rPr lang="en-IN" dirty="0" err="1"/>
-              <a:t>OpenAI</a:t>
-            </a:r>
-            <a:r>
-              <a:rPr lang="en-IN" dirty="0"/>
               <a:t>)</a:t>
             </a:r>
           </a:p>
@@ -5589,7 +6315,7 @@
             <a:pPr algn="just"/>
             <a:r>
               <a:rPr lang="en-IN" dirty="0"/>
-              <a:t>Implement block stacking with audio guidance on physical hardware to emulate the results of simulation</a:t>
+              <a:t>Compare the results of path planning and collision avoidance with classical RRT based algorithms and test robustness against perturbations</a:t>
             </a:r>
           </a:p>
           <a:p>
@@ -6328,135 +7054,6 @@
           <p:cNvPr id="2" name="Title 1">
             <a:extLst>
               <a:ext uri="{FF2B5EF4-FFF2-40B4-BE49-F238E27FC236}">
-                <a16:creationId xmlns:a16="http://schemas.microsoft.com/office/drawing/2014/main" id="{EA3BF008-1F00-4D62-8C08-AB5D72F0D6DC}"/>
-              </a:ext>
-            </a:extLst>
-          </p:cNvPr>
-          <p:cNvSpPr>
-            <a:spLocks noGrp="1"/>
-          </p:cNvSpPr>
-          <p:nvPr>
-            <p:ph type="title"/>
-          </p:nvPr>
-        </p:nvSpPr>
-        <p:spPr/>
-        <p:txBody>
-          <a:bodyPr/>
-          <a:lstStyle/>
-          <a:p>
-            <a:pPr algn="ctr"/>
-            <a:r>
-              <a:rPr lang="en-IN" dirty="0"/>
-              <a:t>Paper 1: One Shot Imitation Learning</a:t>
-            </a:r>
-          </a:p>
-        </p:txBody>
-      </p:sp>
-      <p:sp>
-        <p:nvSpPr>
-          <p:cNvPr id="3" name="Content Placeholder 2">
-            <a:extLst>
-              <a:ext uri="{FF2B5EF4-FFF2-40B4-BE49-F238E27FC236}">
-                <a16:creationId xmlns:a16="http://schemas.microsoft.com/office/drawing/2014/main" id="{AE33E740-7A49-40CB-9419-8C914D645FCA}"/>
-              </a:ext>
-            </a:extLst>
-          </p:cNvPr>
-          <p:cNvSpPr>
-            <a:spLocks noGrp="1"/>
-          </p:cNvSpPr>
-          <p:nvPr>
-            <p:ph idx="1"/>
-          </p:nvPr>
-        </p:nvSpPr>
-        <p:spPr>
-          <a:xfrm>
-            <a:off x="243395" y="1690688"/>
-            <a:ext cx="11679315" cy="4351338"/>
-          </a:xfrm>
-        </p:spPr>
-        <p:txBody>
-          <a:bodyPr/>
-          <a:lstStyle/>
-          <a:p>
-            <a:pPr marL="0" indent="0" algn="ctr">
-              <a:buNone/>
-            </a:pPr>
-            <a:r>
-              <a:rPr lang="en-IN" b="1" dirty="0"/>
-              <a:t>Algorithm</a:t>
-            </a:r>
-          </a:p>
-          <a:p>
-            <a:pPr marL="0" indent="0" algn="ctr">
-              <a:buNone/>
-            </a:pPr>
-            <a:endParaRPr lang="en-IN" dirty="0"/>
-          </a:p>
-          <a:p>
-            <a:pPr algn="just"/>
-            <a:r>
-              <a:rPr lang="en-IN" dirty="0"/>
-              <a:t>Starts by collecting a set of demonstrations for each task and add noise to the actions to have a wider coverage of the trajectory space. </a:t>
-            </a:r>
-          </a:p>
-          <a:p>
-            <a:pPr algn="just"/>
-            <a:r>
-              <a:rPr lang="en-IN" dirty="0"/>
-              <a:t>Behavioural cloning and DAGGER are used to train the neural network</a:t>
-            </a:r>
-          </a:p>
-          <a:p>
-            <a:pPr algn="just"/>
-            <a:r>
-              <a:rPr lang="en-IN" dirty="0" err="1"/>
-              <a:t>Adamax</a:t>
-            </a:r>
-            <a:r>
-              <a:rPr lang="en-IN" dirty="0"/>
-              <a:t> to perform optimization with learning rate of 0.001</a:t>
-            </a:r>
-          </a:p>
-          <a:p>
-            <a:endParaRPr lang="en-IN" dirty="0"/>
-          </a:p>
-        </p:txBody>
-      </p:sp>
-    </p:spTree>
-    <p:extLst>
-      <p:ext uri="{BB962C8B-B14F-4D97-AF65-F5344CB8AC3E}">
-        <p14:creationId xmlns:p14="http://schemas.microsoft.com/office/powerpoint/2010/main" val="1946190697"/>
-      </p:ext>
-    </p:extLst>
-  </p:cSld>
-  <p:clrMapOvr>
-    <a:masterClrMapping/>
-  </p:clrMapOvr>
-</p:sld>
-</file>
-
-<file path=ppt/slides/slide6.xml><?xml version="1.0" encoding="utf-8"?>
-<p:sld xmlns:a="http://schemas.openxmlformats.org/drawingml/2006/main" xmlns:r="http://schemas.openxmlformats.org/officeDocument/2006/relationships" xmlns:p="http://schemas.openxmlformats.org/presentationml/2006/main">
-  <p:cSld>
-    <p:spTree>
-      <p:nvGrpSpPr>
-        <p:cNvPr id="1" name=""/>
-        <p:cNvGrpSpPr/>
-        <p:nvPr/>
-      </p:nvGrpSpPr>
-      <p:grpSpPr>
-        <a:xfrm>
-          <a:off x="0" y="0"/>
-          <a:ext cx="0" cy="0"/>
-          <a:chOff x="0" y="0"/>
-          <a:chExt cx="0" cy="0"/>
-        </a:xfrm>
-      </p:grpSpPr>
-      <p:sp>
-        <p:nvSpPr>
-          <p:cNvPr id="2" name="Title 1">
-            <a:extLst>
-              <a:ext uri="{FF2B5EF4-FFF2-40B4-BE49-F238E27FC236}">
                 <a16:creationId xmlns:a16="http://schemas.microsoft.com/office/drawing/2014/main" id="{D726780B-7E00-4900-908E-549C8088949A}"/>
               </a:ext>
             </a:extLst>
@@ -6532,6 +7129,132 @@
 </p:sld>
 </file>
 
+<file path=ppt/slides/slide6.xml><?xml version="1.0" encoding="utf-8"?>
+<p:sld xmlns:a="http://schemas.openxmlformats.org/drawingml/2006/main" xmlns:r="http://schemas.openxmlformats.org/officeDocument/2006/relationships" xmlns:p="http://schemas.openxmlformats.org/presentationml/2006/main">
+  <p:cSld>
+    <p:spTree>
+      <p:nvGrpSpPr>
+        <p:cNvPr id="1" name=""/>
+        <p:cNvGrpSpPr/>
+        <p:nvPr/>
+      </p:nvGrpSpPr>
+      <p:grpSpPr>
+        <a:xfrm>
+          <a:off x="0" y="0"/>
+          <a:ext cx="0" cy="0"/>
+          <a:chOff x="0" y="0"/>
+          <a:chExt cx="0" cy="0"/>
+        </a:xfrm>
+      </p:grpSpPr>
+      <p:sp>
+        <p:nvSpPr>
+          <p:cNvPr id="2" name="Title 1">
+            <a:extLst>
+              <a:ext uri="{FF2B5EF4-FFF2-40B4-BE49-F238E27FC236}">
+                <a16:creationId xmlns:a16="http://schemas.microsoft.com/office/drawing/2014/main" id="{01900F2C-482A-4EDC-95E0-86B829390E2A}"/>
+              </a:ext>
+            </a:extLst>
+          </p:cNvPr>
+          <p:cNvSpPr>
+            <a:spLocks noGrp="1"/>
+          </p:cNvSpPr>
+          <p:nvPr>
+            <p:ph type="title"/>
+          </p:nvPr>
+        </p:nvSpPr>
+        <p:spPr/>
+        <p:txBody>
+          <a:bodyPr/>
+          <a:lstStyle/>
+          <a:p>
+            <a:pPr algn="ctr"/>
+            <a:r>
+              <a:rPr lang="en-IN" dirty="0"/>
+              <a:t>Paper 1: One Shot Imitation Learning</a:t>
+            </a:r>
+          </a:p>
+        </p:txBody>
+      </p:sp>
+      <p:sp>
+        <p:nvSpPr>
+          <p:cNvPr id="3" name="Content Placeholder 2">
+            <a:extLst>
+              <a:ext uri="{FF2B5EF4-FFF2-40B4-BE49-F238E27FC236}">
+                <a16:creationId xmlns:a16="http://schemas.microsoft.com/office/drawing/2014/main" id="{1C037960-0136-4A3E-A4E2-5E45210D08A3}"/>
+              </a:ext>
+            </a:extLst>
+          </p:cNvPr>
+          <p:cNvSpPr>
+            <a:spLocks noGrp="1"/>
+          </p:cNvSpPr>
+          <p:nvPr>
+            <p:ph idx="1"/>
+          </p:nvPr>
+        </p:nvSpPr>
+        <p:spPr/>
+        <p:txBody>
+          <a:bodyPr>
+            <a:normAutofit fontScale="92500"/>
+          </a:bodyPr>
+          <a:lstStyle/>
+          <a:p>
+            <a:pPr marL="0" indent="0" algn="ctr">
+              <a:buNone/>
+            </a:pPr>
+            <a:r>
+              <a:rPr lang="en-IN" b="1" dirty="0"/>
+              <a:t>Directions for future work</a:t>
+            </a:r>
+          </a:p>
+          <a:p>
+            <a:pPr marL="0" indent="0">
+              <a:buNone/>
+            </a:pPr>
+            <a:endParaRPr lang="en-IN" dirty="0"/>
+          </a:p>
+          <a:p>
+            <a:pPr marL="514350" indent="-514350" algn="just">
+              <a:buAutoNum type="arabicPeriod"/>
+            </a:pPr>
+            <a:r>
+              <a:rPr lang="en-US" dirty="0"/>
+              <a:t>Extend the framework to demonstrations in the form of image data, which will allow more end-to-end learning without requiring a separate perception module</a:t>
+            </a:r>
+          </a:p>
+          <a:p>
+            <a:pPr marL="514350" indent="-514350" algn="just">
+              <a:buAutoNum type="arabicPeriod"/>
+            </a:pPr>
+            <a:r>
+              <a:rPr lang="en-US" dirty="0"/>
+              <a:t>Enabling the policy to condition on multiple demonstrations, in case where one demonstration does not fully resolve ambiguity in the objective</a:t>
+            </a:r>
+          </a:p>
+          <a:p>
+            <a:pPr marL="514350" indent="-514350" algn="just">
+              <a:buAutoNum type="arabicPeriod"/>
+            </a:pPr>
+            <a:r>
+              <a:rPr lang="en-US" dirty="0"/>
+              <a:t>Scale up on a much larger and broader distribution of tasks, and explore its potential towards a general robotics imitation learning system</a:t>
+            </a:r>
+            <a:endParaRPr lang="en-IN" dirty="0"/>
+          </a:p>
+        </p:txBody>
+      </p:sp>
+    </p:spTree>
+    <p:extLst>
+      <p:ext uri="{BB962C8B-B14F-4D97-AF65-F5344CB8AC3E}">
+        <p14:creationId xmlns:p14="http://schemas.microsoft.com/office/powerpoint/2010/main" val="1707015295"/>
+      </p:ext>
+    </p:extLst>
+  </p:cSld>
+  <p:clrMapOvr>
+    <a:masterClrMapping/>
+  </p:clrMapOvr>
+</p:sld>
+</file>
+
 <file path=ppt/slides/slide7.xml><?xml version="1.0" encoding="utf-8"?>
 <p:sld xmlns:a="http://schemas.openxmlformats.org/drawingml/2006/main" xmlns:r="http://schemas.openxmlformats.org/officeDocument/2006/relationships" xmlns:p="http://schemas.openxmlformats.org/presentationml/2006/main">
   <p:cSld>
@@ -6554,7 +7277,7 @@
           <p:cNvPr id="2" name="Title 1">
             <a:extLst>
               <a:ext uri="{FF2B5EF4-FFF2-40B4-BE49-F238E27FC236}">
-                <a16:creationId xmlns:a16="http://schemas.microsoft.com/office/drawing/2014/main" id="{01900F2C-482A-4EDC-95E0-86B829390E2A}"/>
+                <a16:creationId xmlns:a16="http://schemas.microsoft.com/office/drawing/2014/main" id="{50E118D7-F221-4D91-994E-42173F3636B4}"/>
               </a:ext>
             </a:extLst>
           </p:cNvPr>
@@ -6573,7 +7296,7 @@
             <a:pPr algn="ctr"/>
             <a:r>
               <a:rPr lang="en-IN" dirty="0"/>
-              <a:t>Paper 1: One Shot Imitation Learning</a:t>
+              <a:t>Paper 2: Creativity in Robot Manipulation with DRL</a:t>
             </a:r>
           </a:p>
         </p:txBody>
@@ -6583,7 +7306,7 @@
           <p:cNvPr id="3" name="Content Placeholder 2">
             <a:extLst>
               <a:ext uri="{FF2B5EF4-FFF2-40B4-BE49-F238E27FC236}">
-                <a16:creationId xmlns:a16="http://schemas.microsoft.com/office/drawing/2014/main" id="{1C037960-0136-4A3E-A4E2-5E45210D08A3}"/>
+                <a16:creationId xmlns:a16="http://schemas.microsoft.com/office/drawing/2014/main" id="{0FF75848-C5E5-4847-ACB9-F194226A89F6}"/>
               </a:ext>
             </a:extLst>
           </p:cNvPr>
@@ -6597,50 +7320,48 @@
         <p:spPr/>
         <p:txBody>
           <a:bodyPr>
-            <a:normAutofit fontScale="92500" lnSpcReduction="10000"/>
+            <a:normAutofit/>
           </a:bodyPr>
           <a:lstStyle/>
           <a:p>
+            <a:r>
+              <a:rPr lang="en-IN" dirty="0"/>
+              <a:t>Background of Researchers: Carnegie Mellon University</a:t>
+            </a:r>
+          </a:p>
+          <a:p>
+            <a:r>
+              <a:rPr lang="en-IN" dirty="0"/>
+              <a:t>Year of Publication: October, 2019</a:t>
+            </a:r>
+          </a:p>
+          <a:p>
+            <a:endParaRPr lang="en-IN" dirty="0"/>
+          </a:p>
+          <a:p>
             <a:pPr marL="0" indent="0" algn="ctr">
               <a:buNone/>
             </a:pPr>
             <a:r>
               <a:rPr lang="en-IN" b="1" dirty="0"/>
-              <a:t>Directions for future work</a:t>
-            </a:r>
-          </a:p>
-          <a:p>
-            <a:pPr marL="0" indent="0">
-              <a:buNone/>
-            </a:pPr>
-            <a:endParaRPr lang="en-IN" dirty="0"/>
-          </a:p>
-          <a:p>
-            <a:pPr marL="514350" indent="-514350" algn="just">
-              <a:buAutoNum type="arabicPeriod"/>
-            </a:pPr>
-            <a:r>
-              <a:rPr lang="en-US" dirty="0"/>
-              <a:t>Extend the framework to demonstrations in the form of image data, which will allow more end-to-end learning without requiring a separate perception module</a:t>
-            </a:r>
-          </a:p>
-          <a:p>
-            <a:pPr marL="514350" indent="-514350" algn="just">
-              <a:buAutoNum type="arabicPeriod"/>
-            </a:pPr>
-            <a:r>
-              <a:rPr lang="en-US" dirty="0"/>
-              <a:t>Enabling the policy to condition on multiple demonstrations, in case where one demonstration does not fully resolve ambiguity in the objective</a:t>
-            </a:r>
-          </a:p>
-          <a:p>
-            <a:pPr marL="514350" indent="-514350" algn="just">
-              <a:buAutoNum type="arabicPeriod"/>
-            </a:pPr>
-            <a:r>
-              <a:rPr lang="en-US" dirty="0"/>
-              <a:t>Scale up 8 our method on a much larger and broader distribution of tasks, and explore its potential towards a general robotics imitation learning system</a:t>
-            </a:r>
+              <a:t>Abstract</a:t>
+            </a:r>
+          </a:p>
+          <a:p>
+            <a:pPr algn="just"/>
+            <a:r>
+              <a:rPr lang="en-IN" dirty="0"/>
+              <a:t>In contrast to traditional  control theory, DRL is more through in exploration of its environment, allowing the generation of human-like behaviour with creativity</a:t>
+            </a:r>
+          </a:p>
+          <a:p>
+            <a:pPr algn="just"/>
+            <a:r>
+              <a:rPr lang="en-IN" dirty="0"/>
+              <a:t>They designed challenging manipulation tasks, to explore this capability</a:t>
+            </a:r>
+          </a:p>
+          <a:p>
             <a:endParaRPr lang="en-IN" dirty="0"/>
           </a:p>
         </p:txBody>
@@ -6648,7 +7369,7 @@
     </p:spTree>
     <p:extLst>
       <p:ext uri="{BB962C8B-B14F-4D97-AF65-F5344CB8AC3E}">
-        <p14:creationId xmlns:p14="http://schemas.microsoft.com/office/powerpoint/2010/main" val="1707015295"/>
+        <p14:creationId xmlns:p14="http://schemas.microsoft.com/office/powerpoint/2010/main" val="2265392535"/>
       </p:ext>
     </p:extLst>
   </p:cSld>
@@ -6680,7 +7401,7 @@
           <p:cNvPr id="2" name="Title 1">
             <a:extLst>
               <a:ext uri="{FF2B5EF4-FFF2-40B4-BE49-F238E27FC236}">
-                <a16:creationId xmlns:a16="http://schemas.microsoft.com/office/drawing/2014/main" id="{50E118D7-F221-4D91-994E-42173F3636B4}"/>
+                <a16:creationId xmlns:a16="http://schemas.microsoft.com/office/drawing/2014/main" id="{668B1F1B-9823-41B3-B00B-2F624ACA398B}"/>
               </a:ext>
             </a:extLst>
           </p:cNvPr>
@@ -6709,7 +7430,7 @@
           <p:cNvPr id="3" name="Content Placeholder 2">
             <a:extLst>
               <a:ext uri="{FF2B5EF4-FFF2-40B4-BE49-F238E27FC236}">
-                <a16:creationId xmlns:a16="http://schemas.microsoft.com/office/drawing/2014/main" id="{0FF75848-C5E5-4847-ACB9-F194226A89F6}"/>
+                <a16:creationId xmlns:a16="http://schemas.microsoft.com/office/drawing/2014/main" id="{CDB70452-750A-4165-8BF8-ADFA7B9B7E81}"/>
               </a:ext>
             </a:extLst>
           </p:cNvPr>
@@ -6722,49 +7443,66 @@
         </p:nvSpPr>
         <p:spPr/>
         <p:txBody>
-          <a:bodyPr>
-            <a:normAutofit/>
-          </a:bodyPr>
-          <a:lstStyle/>
-          <a:p>
+          <a:bodyPr/>
+          <a:lstStyle/>
+          <a:p>
+            <a:pPr marL="0" indent="0" algn="ctr">
+              <a:buNone/>
+            </a:pPr>
+            <a:r>
+              <a:rPr lang="en-IN" b="1" dirty="0"/>
+              <a:t>Why DRL over traditional control theory?</a:t>
+            </a:r>
+          </a:p>
+          <a:p>
+            <a:pPr marL="0" indent="0" algn="ctr">
+              <a:buNone/>
+            </a:pPr>
+            <a:endParaRPr lang="en-IN" b="1" dirty="0"/>
+          </a:p>
+          <a:p>
+            <a:pPr algn="just"/>
             <a:r>
               <a:rPr lang="en-IN" dirty="0"/>
-              <a:t>Background of Researchers: Carnegie Mellon University</a:t>
-            </a:r>
-          </a:p>
-          <a:p>
+              <a:t>In traditional controls, r</a:t>
+            </a:r>
+            <a:r>
+              <a:rPr lang="en-US" dirty="0" err="1"/>
+              <a:t>obots</a:t>
+            </a:r>
+            <a:r>
+              <a:rPr lang="en-US" dirty="0"/>
+              <a:t> depend heavily on human understanding of the task, the robot itself, and the environment</a:t>
+            </a:r>
+            <a:r>
+              <a:rPr lang="en-IN" b="1" dirty="0"/>
+              <a:t> </a:t>
+            </a:r>
+          </a:p>
+          <a:p>
+            <a:pPr algn="just"/>
+            <a:r>
+              <a:rPr lang="en-US" dirty="0"/>
+              <a:t>Robots assume perfect knowledge of the system’s description and the environment</a:t>
+            </a:r>
+          </a:p>
+          <a:p>
+            <a:pPr algn="just"/>
             <a:r>
               <a:rPr lang="en-IN" dirty="0"/>
-              <a:t>Year of Publication: October, 2019</a:t>
-            </a:r>
-          </a:p>
-          <a:p>
-            <a:endParaRPr lang="en-IN" dirty="0"/>
-          </a:p>
-          <a:p>
-            <a:pPr marL="0" indent="0" algn="ctr">
-              <a:buNone/>
-            </a:pPr>
-            <a:r>
-              <a:rPr lang="en-IN" b="1" dirty="0"/>
-              <a:t>Abstract</a:t>
+              <a:t>DRL techniques </a:t>
+            </a:r>
+            <a:r>
+              <a:rPr lang="en-US" dirty="0"/>
+              <a:t>enable robots to comprehensively explore the environment and learn appropriate solutions</a:t>
             </a:r>
           </a:p>
           <a:p>
             <a:pPr algn="just"/>
             <a:r>
-              <a:rPr lang="en-IN" dirty="0"/>
-              <a:t>In contrast to traditional  control theory, DRL is more through in exploration of its environment, allowing the generation of human-like behaviour with creativity</a:t>
-            </a:r>
-          </a:p>
-          <a:p>
-            <a:pPr algn="just"/>
-            <a:r>
-              <a:rPr lang="en-IN" dirty="0"/>
-              <a:t>They designed challenging manipulation tasks, to explore this capability</a:t>
-            </a:r>
-          </a:p>
-          <a:p>
+              <a:rPr lang="en-US" dirty="0"/>
+              <a:t>Enables task generalization</a:t>
+            </a:r>
             <a:endParaRPr lang="en-IN" dirty="0"/>
           </a:p>
         </p:txBody>
@@ -6772,7 +7510,7 @@
     </p:spTree>
     <p:extLst>
       <p:ext uri="{BB962C8B-B14F-4D97-AF65-F5344CB8AC3E}">
-        <p14:creationId xmlns:p14="http://schemas.microsoft.com/office/powerpoint/2010/main" val="2265392535"/>
+        <p14:creationId xmlns:p14="http://schemas.microsoft.com/office/powerpoint/2010/main" val="4015906100"/>
       </p:ext>
     </p:extLst>
   </p:cSld>
@@ -6804,7 +7542,7 @@
           <p:cNvPr id="2" name="Title 1">
             <a:extLst>
               <a:ext uri="{FF2B5EF4-FFF2-40B4-BE49-F238E27FC236}">
-                <a16:creationId xmlns:a16="http://schemas.microsoft.com/office/drawing/2014/main" id="{668B1F1B-9823-41B3-B00B-2F624ACA398B}"/>
+                <a16:creationId xmlns:a16="http://schemas.microsoft.com/office/drawing/2014/main" id="{363F1B22-6896-4D76-8B3A-D28EBD65FA2C}"/>
               </a:ext>
             </a:extLst>
           </p:cNvPr>
@@ -6833,7 +7571,7 @@
           <p:cNvPr id="3" name="Content Placeholder 2">
             <a:extLst>
               <a:ext uri="{FF2B5EF4-FFF2-40B4-BE49-F238E27FC236}">
-                <a16:creationId xmlns:a16="http://schemas.microsoft.com/office/drawing/2014/main" id="{CDB70452-750A-4165-8BF8-ADFA7B9B7E81}"/>
+                <a16:creationId xmlns:a16="http://schemas.microsoft.com/office/drawing/2014/main" id="{92FE5995-9FD2-4B5F-AB4E-E48EF9E978B6}"/>
               </a:ext>
             </a:extLst>
           </p:cNvPr>
@@ -6844,68 +7582,124 @@
             <p:ph idx="1"/>
           </p:nvPr>
         </p:nvSpPr>
-        <p:spPr/>
-        <p:txBody>
-          <a:bodyPr/>
-          <a:lstStyle/>
+        <p:spPr>
+          <a:xfrm>
+            <a:off x="838200" y="1313895"/>
+            <a:ext cx="11146654" cy="5974672"/>
+          </a:xfrm>
+        </p:spPr>
+        <p:txBody>
+          <a:bodyPr>
+            <a:normAutofit fontScale="85000" lnSpcReduction="20000"/>
+          </a:bodyPr>
+          <a:lstStyle/>
+          <a:p>
+            <a:endParaRPr lang="en-US" dirty="0"/>
+          </a:p>
           <a:p>
             <a:pPr marL="0" indent="0" algn="ctr">
               <a:buNone/>
             </a:pPr>
             <a:r>
-              <a:rPr lang="en-IN" b="1" dirty="0"/>
-              <a:t>Why DRL over traditional control theory?</a:t>
-            </a:r>
-          </a:p>
-          <a:p>
-            <a:pPr marL="0" indent="0" algn="ctr">
+              <a:rPr lang="en-US" b="1" dirty="0"/>
+              <a:t>Experiment</a:t>
+            </a:r>
+          </a:p>
+          <a:p>
+            <a:pPr algn="just"/>
+            <a:r>
+              <a:rPr lang="en-US" dirty="0"/>
+              <a:t>3 types of experiments that require the robot to move a box to the target location within the same table in a simulated environment</a:t>
+            </a:r>
+          </a:p>
+          <a:p>
+            <a:pPr marL="0" indent="0" algn="just">
               <a:buNone/>
             </a:pPr>
-            <a:endParaRPr lang="en-IN" b="1" dirty="0"/>
+            <a:r>
+              <a:rPr lang="en-US" dirty="0"/>
+              <a:t>	1. </a:t>
+            </a:r>
+            <a:r>
+              <a:rPr lang="en-US" b="1" dirty="0"/>
+              <a:t>Ditch</a:t>
+            </a:r>
+            <a:r>
+              <a:rPr lang="en-US" dirty="0"/>
+              <a:t>: The Robot and target are separated by a short ditch 2 cm deep and 2.5 	cm 	wide, located at 26.25 cm from the origin</a:t>
+            </a:r>
+          </a:p>
+          <a:p>
+            <a:pPr marL="0" indent="0" algn="just">
+              <a:buNone/>
+            </a:pPr>
+            <a:endParaRPr lang="en-US" dirty="0"/>
+          </a:p>
+          <a:p>
+            <a:pPr marL="0" indent="0" algn="just">
+              <a:buNone/>
+            </a:pPr>
+            <a:r>
+              <a:rPr lang="en-US" dirty="0"/>
+              <a:t>	2. </a:t>
+            </a:r>
+            <a:r>
+              <a:rPr lang="en-US" b="1" dirty="0"/>
+              <a:t>Wall</a:t>
+            </a:r>
+            <a:r>
+              <a:rPr lang="en-US" dirty="0"/>
+              <a:t>:  The Robot and target are separated by a short wall 3 cm high and 1 cm 	wide, 	located 28 cm from the origin, beyond reach of robot</a:t>
+            </a:r>
+          </a:p>
+          <a:p>
+            <a:pPr marL="0" indent="0" algn="just">
+              <a:buNone/>
+            </a:pPr>
+            <a:endParaRPr lang="en-US" dirty="0"/>
+          </a:p>
+          <a:p>
+            <a:pPr marL="0" indent="0" algn="just">
+              <a:buNone/>
+            </a:pPr>
+            <a:r>
+              <a:rPr lang="en-US" dirty="0"/>
+              <a:t>	3. </a:t>
+            </a:r>
+            <a:r>
+              <a:rPr lang="en-IN" b="1" dirty="0" err="1"/>
+              <a:t>TargetNear</a:t>
+            </a:r>
+            <a:r>
+              <a:rPr lang="en-IN" dirty="0"/>
+              <a:t>: </a:t>
+            </a:r>
+            <a:r>
+              <a:rPr lang="en-US" dirty="0"/>
+              <a:t>The Robot and target are separated by a short wall 3 cm high and 	1 cm wide, located 28 cm from the origin, not beyond reach by robot</a:t>
+            </a:r>
+          </a:p>
+          <a:p>
+            <a:pPr marL="0" indent="0">
+              <a:buNone/>
+            </a:pPr>
+            <a:endParaRPr lang="en-US" dirty="0"/>
           </a:p>
           <a:p>
             <a:pPr algn="just"/>
             <a:r>
-              <a:rPr lang="en-IN" dirty="0"/>
-              <a:t>In traditional controls, r</a:t>
-            </a:r>
-            <a:r>
-              <a:rPr lang="en-US" dirty="0" err="1"/>
-              <a:t>obots</a:t>
-            </a:r>
-            <a:r>
               <a:rPr lang="en-US" dirty="0"/>
-              <a:t> depend heavily on human understanding of the task, the robot itself, and the environment</a:t>
-            </a:r>
-            <a:r>
-              <a:rPr lang="en-IN" b="1" dirty="0"/>
-              <a:t> </a:t>
+              <a:t>Used negative sparse rewards as an incentive for quick exploration (Success: Score = 0; Failure: Score = -1)</a:t>
             </a:r>
           </a:p>
           <a:p>
             <a:pPr algn="just"/>
             <a:r>
               <a:rPr lang="en-US" dirty="0"/>
-              <a:t>Robots assume perfect knowledge of the system’s description and the environment</a:t>
-            </a:r>
-          </a:p>
-          <a:p>
-            <a:pPr algn="just"/>
-            <a:r>
-              <a:rPr lang="en-IN" dirty="0"/>
-              <a:t>DRL techniques </a:t>
-            </a:r>
-            <a:r>
-              <a:rPr lang="en-US" dirty="0"/>
-              <a:t>enable robots to comprehensively explore the environment and learn appropriate solutions</a:t>
-            </a:r>
-          </a:p>
-          <a:p>
-            <a:pPr algn="just"/>
-            <a:r>
-              <a:rPr lang="en-US" dirty="0"/>
-              <a:t>Enables task generalization</a:t>
-            </a:r>
+              <a:t>Yet to be implemented on the real hardware </a:t>
+            </a:r>
+          </a:p>
+          <a:p>
             <a:endParaRPr lang="en-IN" dirty="0"/>
           </a:p>
         </p:txBody>
@@ -6913,7 +7707,7 @@
     </p:spTree>
     <p:extLst>
       <p:ext uri="{BB962C8B-B14F-4D97-AF65-F5344CB8AC3E}">
-        <p14:creationId xmlns:p14="http://schemas.microsoft.com/office/powerpoint/2010/main" val="4015906100"/>
+        <p14:creationId xmlns:p14="http://schemas.microsoft.com/office/powerpoint/2010/main" val="2993472623"/>
       </p:ext>
     </p:extLst>
   </p:cSld>

</xml_diff>